<commit_message>
Started to remove unneeded materials.
</commit_message>
<xml_diff>
--- a/Board/Board.pptx
+++ b/Board/Board.pptx
@@ -7,14 +7,14 @@
   <p:sldIdLst>
     <p:sldId id="256" r:id="rId2"/>
   </p:sldIdLst>
-  <p:sldSz cx="9144000" cy="6858000" type="screen4x3"/>
+  <p:sldSz cx="43891200" cy="32918400"/>
   <p:notesSz cx="6858000" cy="9144000"/>
   <p:defaultTextStyle>
     <a:defPPr>
       <a:defRPr lang="en-US"/>
     </a:defPPr>
-    <a:lvl1pPr marL="0" algn="l" defTabSz="457200" rtl="0" eaLnBrk="1" latinLnBrk="0" hangingPunct="1">
-      <a:defRPr sz="1800" kern="1200">
+    <a:lvl1pPr marL="0" algn="l" defTabSz="2194560" rtl="0" eaLnBrk="1" latinLnBrk="0" hangingPunct="1">
+      <a:defRPr sz="8600" kern="1200">
         <a:solidFill>
           <a:schemeClr val="tx1"/>
         </a:solidFill>
@@ -23,8 +23,8 @@
         <a:cs typeface="+mn-cs"/>
       </a:defRPr>
     </a:lvl1pPr>
-    <a:lvl2pPr marL="457200" algn="l" defTabSz="457200" rtl="0" eaLnBrk="1" latinLnBrk="0" hangingPunct="1">
-      <a:defRPr sz="1800" kern="1200">
+    <a:lvl2pPr marL="2194560" algn="l" defTabSz="2194560" rtl="0" eaLnBrk="1" latinLnBrk="0" hangingPunct="1">
+      <a:defRPr sz="8600" kern="1200">
         <a:solidFill>
           <a:schemeClr val="tx1"/>
         </a:solidFill>
@@ -33,8 +33,8 @@
         <a:cs typeface="+mn-cs"/>
       </a:defRPr>
     </a:lvl2pPr>
-    <a:lvl3pPr marL="914400" algn="l" defTabSz="457200" rtl="0" eaLnBrk="1" latinLnBrk="0" hangingPunct="1">
-      <a:defRPr sz="1800" kern="1200">
+    <a:lvl3pPr marL="4389120" algn="l" defTabSz="2194560" rtl="0" eaLnBrk="1" latinLnBrk="0" hangingPunct="1">
+      <a:defRPr sz="8600" kern="1200">
         <a:solidFill>
           <a:schemeClr val="tx1"/>
         </a:solidFill>
@@ -43,8 +43,8 @@
         <a:cs typeface="+mn-cs"/>
       </a:defRPr>
     </a:lvl3pPr>
-    <a:lvl4pPr marL="1371600" algn="l" defTabSz="457200" rtl="0" eaLnBrk="1" latinLnBrk="0" hangingPunct="1">
-      <a:defRPr sz="1800" kern="1200">
+    <a:lvl4pPr marL="6583680" algn="l" defTabSz="2194560" rtl="0" eaLnBrk="1" latinLnBrk="0" hangingPunct="1">
+      <a:defRPr sz="8600" kern="1200">
         <a:solidFill>
           <a:schemeClr val="tx1"/>
         </a:solidFill>
@@ -53,8 +53,8 @@
         <a:cs typeface="+mn-cs"/>
       </a:defRPr>
     </a:lvl4pPr>
-    <a:lvl5pPr marL="1828800" algn="l" defTabSz="457200" rtl="0" eaLnBrk="1" latinLnBrk="0" hangingPunct="1">
-      <a:defRPr sz="1800" kern="1200">
+    <a:lvl5pPr marL="8778240" algn="l" defTabSz="2194560" rtl="0" eaLnBrk="1" latinLnBrk="0" hangingPunct="1">
+      <a:defRPr sz="8600" kern="1200">
         <a:solidFill>
           <a:schemeClr val="tx1"/>
         </a:solidFill>
@@ -63,8 +63,8 @@
         <a:cs typeface="+mn-cs"/>
       </a:defRPr>
     </a:lvl5pPr>
-    <a:lvl6pPr marL="2286000" algn="l" defTabSz="457200" rtl="0" eaLnBrk="1" latinLnBrk="0" hangingPunct="1">
-      <a:defRPr sz="1800" kern="1200">
+    <a:lvl6pPr marL="10972800" algn="l" defTabSz="2194560" rtl="0" eaLnBrk="1" latinLnBrk="0" hangingPunct="1">
+      <a:defRPr sz="8600" kern="1200">
         <a:solidFill>
           <a:schemeClr val="tx1"/>
         </a:solidFill>
@@ -73,8 +73,8 @@
         <a:cs typeface="+mn-cs"/>
       </a:defRPr>
     </a:lvl6pPr>
-    <a:lvl7pPr marL="2743200" algn="l" defTabSz="457200" rtl="0" eaLnBrk="1" latinLnBrk="0" hangingPunct="1">
-      <a:defRPr sz="1800" kern="1200">
+    <a:lvl7pPr marL="13167360" algn="l" defTabSz="2194560" rtl="0" eaLnBrk="1" latinLnBrk="0" hangingPunct="1">
+      <a:defRPr sz="8600" kern="1200">
         <a:solidFill>
           <a:schemeClr val="tx1"/>
         </a:solidFill>
@@ -83,8 +83,8 @@
         <a:cs typeface="+mn-cs"/>
       </a:defRPr>
     </a:lvl7pPr>
-    <a:lvl8pPr marL="3200400" algn="l" defTabSz="457200" rtl="0" eaLnBrk="1" latinLnBrk="0" hangingPunct="1">
-      <a:defRPr sz="1800" kern="1200">
+    <a:lvl8pPr marL="15361920" algn="l" defTabSz="2194560" rtl="0" eaLnBrk="1" latinLnBrk="0" hangingPunct="1">
+      <a:defRPr sz="8600" kern="1200">
         <a:solidFill>
           <a:schemeClr val="tx1"/>
         </a:solidFill>
@@ -93,8 +93,8 @@
         <a:cs typeface="+mn-cs"/>
       </a:defRPr>
     </a:lvl8pPr>
-    <a:lvl9pPr marL="3657600" algn="l" defTabSz="457200" rtl="0" eaLnBrk="1" latinLnBrk="0" hangingPunct="1">
-      <a:defRPr sz="1800" kern="1200">
+    <a:lvl9pPr marL="17556480" algn="l" defTabSz="2194560" rtl="0" eaLnBrk="1" latinLnBrk="0" hangingPunct="1">
+      <a:defRPr sz="8600" kern="1200">
         <a:solidFill>
           <a:schemeClr val="tx1"/>
         </a:solidFill>
@@ -136,8 +136,8 @@
         </p:nvSpPr>
         <p:spPr>
           <a:xfrm>
-            <a:off x="685800" y="2130425"/>
-            <a:ext cx="7772400" cy="1470025"/>
+            <a:off x="3291840" y="10226042"/>
+            <a:ext cx="37307520" cy="7056120"/>
           </a:xfrm>
         </p:spPr>
         <p:txBody>
@@ -164,8 +164,8 @@
         </p:nvSpPr>
         <p:spPr>
           <a:xfrm>
-            <a:off x="1371600" y="3886200"/>
-            <a:ext cx="6400800" cy="1752600"/>
+            <a:off x="6583680" y="18653760"/>
+            <a:ext cx="30723840" cy="8412480"/>
           </a:xfrm>
         </p:spPr>
         <p:txBody>
@@ -181,7 +181,7 @@
                 </a:solidFill>
               </a:defRPr>
             </a:lvl1pPr>
-            <a:lvl2pPr marL="457200" indent="0" algn="ctr">
+            <a:lvl2pPr marL="2194560" indent="0" algn="ctr">
               <a:buNone/>
               <a:defRPr>
                 <a:solidFill>
@@ -191,7 +191,7 @@
                 </a:solidFill>
               </a:defRPr>
             </a:lvl2pPr>
-            <a:lvl3pPr marL="914400" indent="0" algn="ctr">
+            <a:lvl3pPr marL="4389120" indent="0" algn="ctr">
               <a:buNone/>
               <a:defRPr>
                 <a:solidFill>
@@ -201,7 +201,7 @@
                 </a:solidFill>
               </a:defRPr>
             </a:lvl3pPr>
-            <a:lvl4pPr marL="1371600" indent="0" algn="ctr">
+            <a:lvl4pPr marL="6583680" indent="0" algn="ctr">
               <a:buNone/>
               <a:defRPr>
                 <a:solidFill>
@@ -211,7 +211,7 @@
                 </a:solidFill>
               </a:defRPr>
             </a:lvl4pPr>
-            <a:lvl5pPr marL="1828800" indent="0" algn="ctr">
+            <a:lvl5pPr marL="8778240" indent="0" algn="ctr">
               <a:buNone/>
               <a:defRPr>
                 <a:solidFill>
@@ -221,7 +221,7 @@
                 </a:solidFill>
               </a:defRPr>
             </a:lvl5pPr>
-            <a:lvl6pPr marL="2286000" indent="0" algn="ctr">
+            <a:lvl6pPr marL="10972800" indent="0" algn="ctr">
               <a:buNone/>
               <a:defRPr>
                 <a:solidFill>
@@ -231,7 +231,7 @@
                 </a:solidFill>
               </a:defRPr>
             </a:lvl6pPr>
-            <a:lvl7pPr marL="2743200" indent="0" algn="ctr">
+            <a:lvl7pPr marL="13167360" indent="0" algn="ctr">
               <a:buNone/>
               <a:defRPr>
                 <a:solidFill>
@@ -241,7 +241,7 @@
                 </a:solidFill>
               </a:defRPr>
             </a:lvl7pPr>
-            <a:lvl8pPr marL="3200400" indent="0" algn="ctr">
+            <a:lvl8pPr marL="15361920" indent="0" algn="ctr">
               <a:buNone/>
               <a:defRPr>
                 <a:solidFill>
@@ -251,7 +251,7 @@
                 </a:solidFill>
               </a:defRPr>
             </a:lvl8pPr>
-            <a:lvl9pPr marL="3657600" indent="0" algn="ctr">
+            <a:lvl9pPr marL="17556480" indent="0" algn="ctr">
               <a:buNone/>
               <a:defRPr>
                 <a:solidFill>
@@ -288,7 +288,7 @@
           <a:p>
             <a:fld id="{6B197C2D-8723-A245-B450-88D2DFD389DA}" type="datetimeFigureOut">
               <a:rPr lang="en-US" smtClean="0"/>
-              <a:t>4/7/13</a:t>
+              <a:t>4/18/2013</a:t>
             </a:fld>
             <a:endParaRPr lang="en-US"/>
           </a:p>
@@ -458,7 +458,7 @@
           <a:p>
             <a:fld id="{6B197C2D-8723-A245-B450-88D2DFD389DA}" type="datetimeFigureOut">
               <a:rPr lang="en-US" smtClean="0"/>
-              <a:t>4/7/13</a:t>
+              <a:t>4/18/2013</a:t>
             </a:fld>
             <a:endParaRPr lang="en-US"/>
           </a:p>
@@ -548,8 +548,8 @@
         </p:nvSpPr>
         <p:spPr>
           <a:xfrm>
-            <a:off x="6629400" y="274638"/>
-            <a:ext cx="2057400" cy="5851525"/>
+            <a:off x="31821120" y="1318265"/>
+            <a:ext cx="9875520" cy="28087320"/>
           </a:xfrm>
         </p:spPr>
         <p:txBody>
@@ -576,8 +576,8 @@
         </p:nvSpPr>
         <p:spPr>
           <a:xfrm>
-            <a:off x="457200" y="274638"/>
-            <a:ext cx="6019800" cy="5851525"/>
+            <a:off x="2194560" y="1318265"/>
+            <a:ext cx="28895040" cy="28087320"/>
           </a:xfrm>
         </p:spPr>
         <p:txBody>
@@ -638,7 +638,7 @@
           <a:p>
             <a:fld id="{6B197C2D-8723-A245-B450-88D2DFD389DA}" type="datetimeFigureOut">
               <a:rPr lang="en-US" smtClean="0"/>
-              <a:t>4/7/13</a:t>
+              <a:t>4/18/2013</a:t>
             </a:fld>
             <a:endParaRPr lang="en-US"/>
           </a:p>
@@ -808,7 +808,7 @@
           <a:p>
             <a:fld id="{6B197C2D-8723-A245-B450-88D2DFD389DA}" type="datetimeFigureOut">
               <a:rPr lang="en-US" smtClean="0"/>
-              <a:t>4/7/13</a:t>
+              <a:t>4/18/2013</a:t>
             </a:fld>
             <a:endParaRPr lang="en-US"/>
           </a:p>
@@ -898,15 +898,15 @@
         </p:nvSpPr>
         <p:spPr>
           <a:xfrm>
-            <a:off x="722313" y="4406900"/>
-            <a:ext cx="7772400" cy="1362075"/>
+            <a:off x="3467102" y="21153122"/>
+            <a:ext cx="37307520" cy="6537960"/>
           </a:xfrm>
         </p:spPr>
         <p:txBody>
           <a:bodyPr anchor="t"/>
           <a:lstStyle>
             <a:lvl1pPr algn="l">
-              <a:defRPr sz="4000" b="1" cap="all"/>
+              <a:defRPr sz="19200" b="1" cap="all"/>
             </a:lvl1pPr>
           </a:lstStyle>
           <a:p>
@@ -930,8 +930,8 @@
         </p:nvSpPr>
         <p:spPr>
           <a:xfrm>
-            <a:off x="722313" y="2906713"/>
-            <a:ext cx="7772400" cy="1500187"/>
+            <a:off x="3467102" y="13952225"/>
+            <a:ext cx="37307520" cy="7200898"/>
           </a:xfrm>
         </p:spPr>
         <p:txBody>
@@ -939,7 +939,7 @@
           <a:lstStyle>
             <a:lvl1pPr marL="0" indent="0">
               <a:buNone/>
-              <a:defRPr sz="2000">
+              <a:defRPr sz="9600">
                 <a:solidFill>
                   <a:schemeClr val="tx1">
                     <a:tint val="75000"/>
@@ -947,9 +947,9 @@
                 </a:solidFill>
               </a:defRPr>
             </a:lvl1pPr>
-            <a:lvl2pPr marL="457200" indent="0">
-              <a:buNone/>
-              <a:defRPr sz="1800">
+            <a:lvl2pPr marL="2194560" indent="0">
+              <a:buNone/>
+              <a:defRPr sz="8600">
                 <a:solidFill>
                   <a:schemeClr val="tx1">
                     <a:tint val="75000"/>
@@ -957,9 +957,9 @@
                 </a:solidFill>
               </a:defRPr>
             </a:lvl2pPr>
-            <a:lvl3pPr marL="914400" indent="0">
-              <a:buNone/>
-              <a:defRPr sz="1600">
+            <a:lvl3pPr marL="4389120" indent="0">
+              <a:buNone/>
+              <a:defRPr sz="7700">
                 <a:solidFill>
                   <a:schemeClr val="tx1">
                     <a:tint val="75000"/>
@@ -967,9 +967,9 @@
                 </a:solidFill>
               </a:defRPr>
             </a:lvl3pPr>
-            <a:lvl4pPr marL="1371600" indent="0">
-              <a:buNone/>
-              <a:defRPr sz="1400">
+            <a:lvl4pPr marL="6583680" indent="0">
+              <a:buNone/>
+              <a:defRPr sz="6700">
                 <a:solidFill>
                   <a:schemeClr val="tx1">
                     <a:tint val="75000"/>
@@ -977,9 +977,9 @@
                 </a:solidFill>
               </a:defRPr>
             </a:lvl4pPr>
-            <a:lvl5pPr marL="1828800" indent="0">
-              <a:buNone/>
-              <a:defRPr sz="1400">
+            <a:lvl5pPr marL="8778240" indent="0">
+              <a:buNone/>
+              <a:defRPr sz="6700">
                 <a:solidFill>
                   <a:schemeClr val="tx1">
                     <a:tint val="75000"/>
@@ -987,9 +987,9 @@
                 </a:solidFill>
               </a:defRPr>
             </a:lvl5pPr>
-            <a:lvl6pPr marL="2286000" indent="0">
-              <a:buNone/>
-              <a:defRPr sz="1400">
+            <a:lvl6pPr marL="10972800" indent="0">
+              <a:buNone/>
+              <a:defRPr sz="6700">
                 <a:solidFill>
                   <a:schemeClr val="tx1">
                     <a:tint val="75000"/>
@@ -997,9 +997,9 @@
                 </a:solidFill>
               </a:defRPr>
             </a:lvl6pPr>
-            <a:lvl7pPr marL="2743200" indent="0">
-              <a:buNone/>
-              <a:defRPr sz="1400">
+            <a:lvl7pPr marL="13167360" indent="0">
+              <a:buNone/>
+              <a:defRPr sz="6700">
                 <a:solidFill>
                   <a:schemeClr val="tx1">
                     <a:tint val="75000"/>
@@ -1007,9 +1007,9 @@
                 </a:solidFill>
               </a:defRPr>
             </a:lvl7pPr>
-            <a:lvl8pPr marL="3200400" indent="0">
-              <a:buNone/>
-              <a:defRPr sz="1400">
+            <a:lvl8pPr marL="15361920" indent="0">
+              <a:buNone/>
+              <a:defRPr sz="6700">
                 <a:solidFill>
                   <a:schemeClr val="tx1">
                     <a:tint val="75000"/>
@@ -1017,9 +1017,9 @@
                 </a:solidFill>
               </a:defRPr>
             </a:lvl8pPr>
-            <a:lvl9pPr marL="3657600" indent="0">
-              <a:buNone/>
-              <a:defRPr sz="1400">
+            <a:lvl9pPr marL="17556480" indent="0">
+              <a:buNone/>
+              <a:defRPr sz="6700">
                 <a:solidFill>
                   <a:schemeClr val="tx1">
                     <a:tint val="75000"/>
@@ -1054,7 +1054,7 @@
           <a:p>
             <a:fld id="{6B197C2D-8723-A245-B450-88D2DFD389DA}" type="datetimeFigureOut">
               <a:rPr lang="en-US" smtClean="0"/>
-              <a:t>4/7/13</a:t>
+              <a:t>4/18/2013</a:t>
             </a:fld>
             <a:endParaRPr lang="en-US"/>
           </a:p>
@@ -1167,39 +1167,39 @@
         </p:nvSpPr>
         <p:spPr>
           <a:xfrm>
-            <a:off x="457200" y="1600200"/>
-            <a:ext cx="4038600" cy="4525963"/>
+            <a:off x="2194560" y="7680963"/>
+            <a:ext cx="19385280" cy="21724622"/>
           </a:xfrm>
         </p:spPr>
         <p:txBody>
           <a:bodyPr/>
           <a:lstStyle>
             <a:lvl1pPr>
-              <a:defRPr sz="2800"/>
+              <a:defRPr sz="13400"/>
             </a:lvl1pPr>
             <a:lvl2pPr>
-              <a:defRPr sz="2400"/>
+              <a:defRPr sz="11500"/>
             </a:lvl2pPr>
             <a:lvl3pPr>
-              <a:defRPr sz="2000"/>
+              <a:defRPr sz="9600"/>
             </a:lvl3pPr>
             <a:lvl4pPr>
-              <a:defRPr sz="1800"/>
+              <a:defRPr sz="8600"/>
             </a:lvl4pPr>
             <a:lvl5pPr>
-              <a:defRPr sz="1800"/>
+              <a:defRPr sz="8600"/>
             </a:lvl5pPr>
             <a:lvl6pPr>
-              <a:defRPr sz="1800"/>
+              <a:defRPr sz="8600"/>
             </a:lvl6pPr>
             <a:lvl7pPr>
-              <a:defRPr sz="1800"/>
+              <a:defRPr sz="8600"/>
             </a:lvl7pPr>
             <a:lvl8pPr>
-              <a:defRPr sz="1800"/>
+              <a:defRPr sz="8600"/>
             </a:lvl8pPr>
             <a:lvl9pPr>
-              <a:defRPr sz="1800"/>
+              <a:defRPr sz="8600"/>
             </a:lvl9pPr>
           </a:lstStyle>
           <a:p>
@@ -1252,39 +1252,39 @@
         </p:nvSpPr>
         <p:spPr>
           <a:xfrm>
-            <a:off x="4648200" y="1600200"/>
-            <a:ext cx="4038600" cy="4525963"/>
+            <a:off x="22311360" y="7680963"/>
+            <a:ext cx="19385280" cy="21724622"/>
           </a:xfrm>
         </p:spPr>
         <p:txBody>
           <a:bodyPr/>
           <a:lstStyle>
             <a:lvl1pPr>
-              <a:defRPr sz="2800"/>
+              <a:defRPr sz="13400"/>
             </a:lvl1pPr>
             <a:lvl2pPr>
-              <a:defRPr sz="2400"/>
+              <a:defRPr sz="11500"/>
             </a:lvl2pPr>
             <a:lvl3pPr>
-              <a:defRPr sz="2000"/>
+              <a:defRPr sz="9600"/>
             </a:lvl3pPr>
             <a:lvl4pPr>
-              <a:defRPr sz="1800"/>
+              <a:defRPr sz="8600"/>
             </a:lvl4pPr>
             <a:lvl5pPr>
-              <a:defRPr sz="1800"/>
+              <a:defRPr sz="8600"/>
             </a:lvl5pPr>
             <a:lvl6pPr>
-              <a:defRPr sz="1800"/>
+              <a:defRPr sz="8600"/>
             </a:lvl6pPr>
             <a:lvl7pPr>
-              <a:defRPr sz="1800"/>
+              <a:defRPr sz="8600"/>
             </a:lvl7pPr>
             <a:lvl8pPr>
-              <a:defRPr sz="1800"/>
+              <a:defRPr sz="8600"/>
             </a:lvl8pPr>
             <a:lvl9pPr>
-              <a:defRPr sz="1800"/>
+              <a:defRPr sz="8600"/>
             </a:lvl9pPr>
           </a:lstStyle>
           <a:p>
@@ -1342,7 +1342,7 @@
           <a:p>
             <a:fld id="{6B197C2D-8723-A245-B450-88D2DFD389DA}" type="datetimeFigureOut">
               <a:rPr lang="en-US" smtClean="0"/>
-              <a:t>4/7/13</a:t>
+              <a:t>4/18/2013</a:t>
             </a:fld>
             <a:endParaRPr lang="en-US"/>
           </a:p>
@@ -1459,8 +1459,8 @@
         </p:nvSpPr>
         <p:spPr>
           <a:xfrm>
-            <a:off x="457200" y="1535113"/>
-            <a:ext cx="4040188" cy="639762"/>
+            <a:off x="2194560" y="7368542"/>
+            <a:ext cx="19392902" cy="3070858"/>
           </a:xfrm>
         </p:spPr>
         <p:txBody>
@@ -1468,39 +1468,39 @@
           <a:lstStyle>
             <a:lvl1pPr marL="0" indent="0">
               <a:buNone/>
-              <a:defRPr sz="2400" b="1"/>
+              <a:defRPr sz="11500" b="1"/>
             </a:lvl1pPr>
-            <a:lvl2pPr marL="457200" indent="0">
-              <a:buNone/>
-              <a:defRPr sz="2000" b="1"/>
+            <a:lvl2pPr marL="2194560" indent="0">
+              <a:buNone/>
+              <a:defRPr sz="9600" b="1"/>
             </a:lvl2pPr>
-            <a:lvl3pPr marL="914400" indent="0">
-              <a:buNone/>
-              <a:defRPr sz="1800" b="1"/>
+            <a:lvl3pPr marL="4389120" indent="0">
+              <a:buNone/>
+              <a:defRPr sz="8600" b="1"/>
             </a:lvl3pPr>
-            <a:lvl4pPr marL="1371600" indent="0">
-              <a:buNone/>
-              <a:defRPr sz="1600" b="1"/>
+            <a:lvl4pPr marL="6583680" indent="0">
+              <a:buNone/>
+              <a:defRPr sz="7700" b="1"/>
             </a:lvl4pPr>
-            <a:lvl5pPr marL="1828800" indent="0">
-              <a:buNone/>
-              <a:defRPr sz="1600" b="1"/>
+            <a:lvl5pPr marL="8778240" indent="0">
+              <a:buNone/>
+              <a:defRPr sz="7700" b="1"/>
             </a:lvl5pPr>
-            <a:lvl6pPr marL="2286000" indent="0">
-              <a:buNone/>
-              <a:defRPr sz="1600" b="1"/>
+            <a:lvl6pPr marL="10972800" indent="0">
+              <a:buNone/>
+              <a:defRPr sz="7700" b="1"/>
             </a:lvl6pPr>
-            <a:lvl7pPr marL="2743200" indent="0">
-              <a:buNone/>
-              <a:defRPr sz="1600" b="1"/>
+            <a:lvl7pPr marL="13167360" indent="0">
+              <a:buNone/>
+              <a:defRPr sz="7700" b="1"/>
             </a:lvl7pPr>
-            <a:lvl8pPr marL="3200400" indent="0">
-              <a:buNone/>
-              <a:defRPr sz="1600" b="1"/>
+            <a:lvl8pPr marL="15361920" indent="0">
+              <a:buNone/>
+              <a:defRPr sz="7700" b="1"/>
             </a:lvl8pPr>
-            <a:lvl9pPr marL="3657600" indent="0">
-              <a:buNone/>
-              <a:defRPr sz="1600" b="1"/>
+            <a:lvl9pPr marL="17556480" indent="0">
+              <a:buNone/>
+              <a:defRPr sz="7700" b="1"/>
             </a:lvl9pPr>
           </a:lstStyle>
           <a:p>
@@ -1524,39 +1524,39 @@
         </p:nvSpPr>
         <p:spPr>
           <a:xfrm>
-            <a:off x="457200" y="2174875"/>
-            <a:ext cx="4040188" cy="3951288"/>
+            <a:off x="2194560" y="10439400"/>
+            <a:ext cx="19392902" cy="18966182"/>
           </a:xfrm>
         </p:spPr>
         <p:txBody>
           <a:bodyPr/>
           <a:lstStyle>
             <a:lvl1pPr>
-              <a:defRPr sz="2400"/>
+              <a:defRPr sz="11500"/>
             </a:lvl1pPr>
             <a:lvl2pPr>
-              <a:defRPr sz="2000"/>
+              <a:defRPr sz="9600"/>
             </a:lvl2pPr>
             <a:lvl3pPr>
-              <a:defRPr sz="1800"/>
+              <a:defRPr sz="8600"/>
             </a:lvl3pPr>
             <a:lvl4pPr>
-              <a:defRPr sz="1600"/>
+              <a:defRPr sz="7700"/>
             </a:lvl4pPr>
             <a:lvl5pPr>
-              <a:defRPr sz="1600"/>
+              <a:defRPr sz="7700"/>
             </a:lvl5pPr>
             <a:lvl6pPr>
-              <a:defRPr sz="1600"/>
+              <a:defRPr sz="7700"/>
             </a:lvl6pPr>
             <a:lvl7pPr>
-              <a:defRPr sz="1600"/>
+              <a:defRPr sz="7700"/>
             </a:lvl7pPr>
             <a:lvl8pPr>
-              <a:defRPr sz="1600"/>
+              <a:defRPr sz="7700"/>
             </a:lvl8pPr>
             <a:lvl9pPr>
-              <a:defRPr sz="1600"/>
+              <a:defRPr sz="7700"/>
             </a:lvl9pPr>
           </a:lstStyle>
           <a:p>
@@ -1609,8 +1609,8 @@
         </p:nvSpPr>
         <p:spPr>
           <a:xfrm>
-            <a:off x="4645025" y="1535113"/>
-            <a:ext cx="4041775" cy="639762"/>
+            <a:off x="22296122" y="7368542"/>
+            <a:ext cx="19400520" cy="3070858"/>
           </a:xfrm>
         </p:spPr>
         <p:txBody>
@@ -1618,39 +1618,39 @@
           <a:lstStyle>
             <a:lvl1pPr marL="0" indent="0">
               <a:buNone/>
-              <a:defRPr sz="2400" b="1"/>
+              <a:defRPr sz="11500" b="1"/>
             </a:lvl1pPr>
-            <a:lvl2pPr marL="457200" indent="0">
-              <a:buNone/>
-              <a:defRPr sz="2000" b="1"/>
+            <a:lvl2pPr marL="2194560" indent="0">
+              <a:buNone/>
+              <a:defRPr sz="9600" b="1"/>
             </a:lvl2pPr>
-            <a:lvl3pPr marL="914400" indent="0">
-              <a:buNone/>
-              <a:defRPr sz="1800" b="1"/>
+            <a:lvl3pPr marL="4389120" indent="0">
+              <a:buNone/>
+              <a:defRPr sz="8600" b="1"/>
             </a:lvl3pPr>
-            <a:lvl4pPr marL="1371600" indent="0">
-              <a:buNone/>
-              <a:defRPr sz="1600" b="1"/>
+            <a:lvl4pPr marL="6583680" indent="0">
+              <a:buNone/>
+              <a:defRPr sz="7700" b="1"/>
             </a:lvl4pPr>
-            <a:lvl5pPr marL="1828800" indent="0">
-              <a:buNone/>
-              <a:defRPr sz="1600" b="1"/>
+            <a:lvl5pPr marL="8778240" indent="0">
+              <a:buNone/>
+              <a:defRPr sz="7700" b="1"/>
             </a:lvl5pPr>
-            <a:lvl6pPr marL="2286000" indent="0">
-              <a:buNone/>
-              <a:defRPr sz="1600" b="1"/>
+            <a:lvl6pPr marL="10972800" indent="0">
+              <a:buNone/>
+              <a:defRPr sz="7700" b="1"/>
             </a:lvl6pPr>
-            <a:lvl7pPr marL="2743200" indent="0">
-              <a:buNone/>
-              <a:defRPr sz="1600" b="1"/>
+            <a:lvl7pPr marL="13167360" indent="0">
+              <a:buNone/>
+              <a:defRPr sz="7700" b="1"/>
             </a:lvl7pPr>
-            <a:lvl8pPr marL="3200400" indent="0">
-              <a:buNone/>
-              <a:defRPr sz="1600" b="1"/>
+            <a:lvl8pPr marL="15361920" indent="0">
+              <a:buNone/>
+              <a:defRPr sz="7700" b="1"/>
             </a:lvl8pPr>
-            <a:lvl9pPr marL="3657600" indent="0">
-              <a:buNone/>
-              <a:defRPr sz="1600" b="1"/>
+            <a:lvl9pPr marL="17556480" indent="0">
+              <a:buNone/>
+              <a:defRPr sz="7700" b="1"/>
             </a:lvl9pPr>
           </a:lstStyle>
           <a:p>
@@ -1674,39 +1674,39 @@
         </p:nvSpPr>
         <p:spPr>
           <a:xfrm>
-            <a:off x="4645025" y="2174875"/>
-            <a:ext cx="4041775" cy="3951288"/>
+            <a:off x="22296122" y="10439400"/>
+            <a:ext cx="19400520" cy="18966182"/>
           </a:xfrm>
         </p:spPr>
         <p:txBody>
           <a:bodyPr/>
           <a:lstStyle>
             <a:lvl1pPr>
-              <a:defRPr sz="2400"/>
+              <a:defRPr sz="11500"/>
             </a:lvl1pPr>
             <a:lvl2pPr>
-              <a:defRPr sz="2000"/>
+              <a:defRPr sz="9600"/>
             </a:lvl2pPr>
             <a:lvl3pPr>
-              <a:defRPr sz="1800"/>
+              <a:defRPr sz="8600"/>
             </a:lvl3pPr>
             <a:lvl4pPr>
-              <a:defRPr sz="1600"/>
+              <a:defRPr sz="7700"/>
             </a:lvl4pPr>
             <a:lvl5pPr>
-              <a:defRPr sz="1600"/>
+              <a:defRPr sz="7700"/>
             </a:lvl5pPr>
             <a:lvl6pPr>
-              <a:defRPr sz="1600"/>
+              <a:defRPr sz="7700"/>
             </a:lvl6pPr>
             <a:lvl7pPr>
-              <a:defRPr sz="1600"/>
+              <a:defRPr sz="7700"/>
             </a:lvl7pPr>
             <a:lvl8pPr>
-              <a:defRPr sz="1600"/>
+              <a:defRPr sz="7700"/>
             </a:lvl8pPr>
             <a:lvl9pPr>
-              <a:defRPr sz="1600"/>
+              <a:defRPr sz="7700"/>
             </a:lvl9pPr>
           </a:lstStyle>
           <a:p>
@@ -1764,7 +1764,7 @@
           <a:p>
             <a:fld id="{6B197C2D-8723-A245-B450-88D2DFD389DA}" type="datetimeFigureOut">
               <a:rPr lang="en-US" smtClean="0"/>
-              <a:t>4/7/13</a:t>
+              <a:t>4/18/2013</a:t>
             </a:fld>
             <a:endParaRPr lang="en-US"/>
           </a:p>
@@ -1882,7 +1882,7 @@
           <a:p>
             <a:fld id="{6B197C2D-8723-A245-B450-88D2DFD389DA}" type="datetimeFigureOut">
               <a:rPr lang="en-US" smtClean="0"/>
-              <a:t>4/7/13</a:t>
+              <a:t>4/18/2013</a:t>
             </a:fld>
             <a:endParaRPr lang="en-US"/>
           </a:p>
@@ -1977,7 +1977,7 @@
           <a:p>
             <a:fld id="{6B197C2D-8723-A245-B450-88D2DFD389DA}" type="datetimeFigureOut">
               <a:rPr lang="en-US" smtClean="0"/>
-              <a:t>4/7/13</a:t>
+              <a:t>4/18/2013</a:t>
             </a:fld>
             <a:endParaRPr lang="en-US"/>
           </a:p>
@@ -2067,15 +2067,15 @@
         </p:nvSpPr>
         <p:spPr>
           <a:xfrm>
-            <a:off x="457200" y="273050"/>
-            <a:ext cx="3008313" cy="1162050"/>
+            <a:off x="2194563" y="1310640"/>
+            <a:ext cx="14439902" cy="5577840"/>
           </a:xfrm>
         </p:spPr>
         <p:txBody>
           <a:bodyPr anchor="b"/>
           <a:lstStyle>
             <a:lvl1pPr algn="l">
-              <a:defRPr sz="2000" b="1"/>
+              <a:defRPr sz="9600" b="1"/>
             </a:lvl1pPr>
           </a:lstStyle>
           <a:p>
@@ -2099,39 +2099,39 @@
         </p:nvSpPr>
         <p:spPr>
           <a:xfrm>
-            <a:off x="3575050" y="273050"/>
-            <a:ext cx="5111750" cy="5853113"/>
+            <a:off x="17160240" y="1310643"/>
+            <a:ext cx="24536400" cy="28094942"/>
           </a:xfrm>
         </p:spPr>
         <p:txBody>
           <a:bodyPr/>
           <a:lstStyle>
             <a:lvl1pPr>
-              <a:defRPr sz="3200"/>
+              <a:defRPr sz="15400"/>
             </a:lvl1pPr>
             <a:lvl2pPr>
-              <a:defRPr sz="2800"/>
+              <a:defRPr sz="13400"/>
             </a:lvl2pPr>
             <a:lvl3pPr>
-              <a:defRPr sz="2400"/>
+              <a:defRPr sz="11500"/>
             </a:lvl3pPr>
             <a:lvl4pPr>
-              <a:defRPr sz="2000"/>
+              <a:defRPr sz="9600"/>
             </a:lvl4pPr>
             <a:lvl5pPr>
-              <a:defRPr sz="2000"/>
+              <a:defRPr sz="9600"/>
             </a:lvl5pPr>
             <a:lvl6pPr>
-              <a:defRPr sz="2000"/>
+              <a:defRPr sz="9600"/>
             </a:lvl6pPr>
             <a:lvl7pPr>
-              <a:defRPr sz="2000"/>
+              <a:defRPr sz="9600"/>
             </a:lvl7pPr>
             <a:lvl8pPr>
-              <a:defRPr sz="2000"/>
+              <a:defRPr sz="9600"/>
             </a:lvl8pPr>
             <a:lvl9pPr>
-              <a:defRPr sz="2000"/>
+              <a:defRPr sz="9600"/>
             </a:lvl9pPr>
           </a:lstStyle>
           <a:p>
@@ -2184,8 +2184,8 @@
         </p:nvSpPr>
         <p:spPr>
           <a:xfrm>
-            <a:off x="457200" y="1435100"/>
-            <a:ext cx="3008313" cy="4691063"/>
+            <a:off x="2194563" y="6888483"/>
+            <a:ext cx="14439902" cy="22517102"/>
           </a:xfrm>
         </p:spPr>
         <p:txBody>
@@ -2193,39 +2193,39 @@
           <a:lstStyle>
             <a:lvl1pPr marL="0" indent="0">
               <a:buNone/>
-              <a:defRPr sz="1400"/>
+              <a:defRPr sz="6700"/>
             </a:lvl1pPr>
-            <a:lvl2pPr marL="457200" indent="0">
-              <a:buNone/>
-              <a:defRPr sz="1200"/>
+            <a:lvl2pPr marL="2194560" indent="0">
+              <a:buNone/>
+              <a:defRPr sz="5800"/>
             </a:lvl2pPr>
-            <a:lvl3pPr marL="914400" indent="0">
-              <a:buNone/>
-              <a:defRPr sz="1000"/>
+            <a:lvl3pPr marL="4389120" indent="0">
+              <a:buNone/>
+              <a:defRPr sz="4800"/>
             </a:lvl3pPr>
-            <a:lvl4pPr marL="1371600" indent="0">
-              <a:buNone/>
-              <a:defRPr sz="900"/>
+            <a:lvl4pPr marL="6583680" indent="0">
+              <a:buNone/>
+              <a:defRPr sz="4300"/>
             </a:lvl4pPr>
-            <a:lvl5pPr marL="1828800" indent="0">
-              <a:buNone/>
-              <a:defRPr sz="900"/>
+            <a:lvl5pPr marL="8778240" indent="0">
+              <a:buNone/>
+              <a:defRPr sz="4300"/>
             </a:lvl5pPr>
-            <a:lvl6pPr marL="2286000" indent="0">
-              <a:buNone/>
-              <a:defRPr sz="900"/>
+            <a:lvl6pPr marL="10972800" indent="0">
+              <a:buNone/>
+              <a:defRPr sz="4300"/>
             </a:lvl6pPr>
-            <a:lvl7pPr marL="2743200" indent="0">
-              <a:buNone/>
-              <a:defRPr sz="900"/>
+            <a:lvl7pPr marL="13167360" indent="0">
+              <a:buNone/>
+              <a:defRPr sz="4300"/>
             </a:lvl7pPr>
-            <a:lvl8pPr marL="3200400" indent="0">
-              <a:buNone/>
-              <a:defRPr sz="900"/>
+            <a:lvl8pPr marL="15361920" indent="0">
+              <a:buNone/>
+              <a:defRPr sz="4300"/>
             </a:lvl8pPr>
-            <a:lvl9pPr marL="3657600" indent="0">
-              <a:buNone/>
-              <a:defRPr sz="900"/>
+            <a:lvl9pPr marL="17556480" indent="0">
+              <a:buNone/>
+              <a:defRPr sz="4300"/>
             </a:lvl9pPr>
           </a:lstStyle>
           <a:p>
@@ -2254,7 +2254,7 @@
           <a:p>
             <a:fld id="{6B197C2D-8723-A245-B450-88D2DFD389DA}" type="datetimeFigureOut">
               <a:rPr lang="en-US" smtClean="0"/>
-              <a:t>4/7/13</a:t>
+              <a:t>4/18/2013</a:t>
             </a:fld>
             <a:endParaRPr lang="en-US"/>
           </a:p>
@@ -2344,15 +2344,15 @@
         </p:nvSpPr>
         <p:spPr>
           <a:xfrm>
-            <a:off x="1792288" y="4800600"/>
-            <a:ext cx="5486400" cy="566738"/>
+            <a:off x="8602982" y="23042880"/>
+            <a:ext cx="26334720" cy="2720342"/>
           </a:xfrm>
         </p:spPr>
         <p:txBody>
           <a:bodyPr anchor="b"/>
           <a:lstStyle>
             <a:lvl1pPr algn="l">
-              <a:defRPr sz="2000" b="1"/>
+              <a:defRPr sz="9600" b="1"/>
             </a:lvl1pPr>
           </a:lstStyle>
           <a:p>
@@ -2376,8 +2376,8 @@
         </p:nvSpPr>
         <p:spPr>
           <a:xfrm>
-            <a:off x="1792288" y="612775"/>
-            <a:ext cx="5486400" cy="4114800"/>
+            <a:off x="8602982" y="2941320"/>
+            <a:ext cx="26334720" cy="19751040"/>
           </a:xfrm>
         </p:spPr>
         <p:txBody>
@@ -2385,39 +2385,39 @@
           <a:lstStyle>
             <a:lvl1pPr marL="0" indent="0">
               <a:buNone/>
-              <a:defRPr sz="3200"/>
+              <a:defRPr sz="15400"/>
             </a:lvl1pPr>
-            <a:lvl2pPr marL="457200" indent="0">
-              <a:buNone/>
-              <a:defRPr sz="2800"/>
+            <a:lvl2pPr marL="2194560" indent="0">
+              <a:buNone/>
+              <a:defRPr sz="13400"/>
             </a:lvl2pPr>
-            <a:lvl3pPr marL="914400" indent="0">
-              <a:buNone/>
-              <a:defRPr sz="2400"/>
+            <a:lvl3pPr marL="4389120" indent="0">
+              <a:buNone/>
+              <a:defRPr sz="11500"/>
             </a:lvl3pPr>
-            <a:lvl4pPr marL="1371600" indent="0">
-              <a:buNone/>
-              <a:defRPr sz="2000"/>
+            <a:lvl4pPr marL="6583680" indent="0">
+              <a:buNone/>
+              <a:defRPr sz="9600"/>
             </a:lvl4pPr>
-            <a:lvl5pPr marL="1828800" indent="0">
-              <a:buNone/>
-              <a:defRPr sz="2000"/>
+            <a:lvl5pPr marL="8778240" indent="0">
+              <a:buNone/>
+              <a:defRPr sz="9600"/>
             </a:lvl5pPr>
-            <a:lvl6pPr marL="2286000" indent="0">
-              <a:buNone/>
-              <a:defRPr sz="2000"/>
+            <a:lvl6pPr marL="10972800" indent="0">
+              <a:buNone/>
+              <a:defRPr sz="9600"/>
             </a:lvl6pPr>
-            <a:lvl7pPr marL="2743200" indent="0">
-              <a:buNone/>
-              <a:defRPr sz="2000"/>
+            <a:lvl7pPr marL="13167360" indent="0">
+              <a:buNone/>
+              <a:defRPr sz="9600"/>
             </a:lvl7pPr>
-            <a:lvl8pPr marL="3200400" indent="0">
-              <a:buNone/>
-              <a:defRPr sz="2000"/>
+            <a:lvl8pPr marL="15361920" indent="0">
+              <a:buNone/>
+              <a:defRPr sz="9600"/>
             </a:lvl8pPr>
-            <a:lvl9pPr marL="3657600" indent="0">
-              <a:buNone/>
-              <a:defRPr sz="2000"/>
+            <a:lvl9pPr marL="17556480" indent="0">
+              <a:buNone/>
+              <a:defRPr sz="9600"/>
             </a:lvl9pPr>
           </a:lstStyle>
           <a:p>
@@ -2437,8 +2437,8 @@
         </p:nvSpPr>
         <p:spPr>
           <a:xfrm>
-            <a:off x="1792288" y="5367338"/>
-            <a:ext cx="5486400" cy="804862"/>
+            <a:off x="8602982" y="25763222"/>
+            <a:ext cx="26334720" cy="3863338"/>
           </a:xfrm>
         </p:spPr>
         <p:txBody>
@@ -2446,39 +2446,39 @@
           <a:lstStyle>
             <a:lvl1pPr marL="0" indent="0">
               <a:buNone/>
-              <a:defRPr sz="1400"/>
+              <a:defRPr sz="6700"/>
             </a:lvl1pPr>
-            <a:lvl2pPr marL="457200" indent="0">
-              <a:buNone/>
-              <a:defRPr sz="1200"/>
+            <a:lvl2pPr marL="2194560" indent="0">
+              <a:buNone/>
+              <a:defRPr sz="5800"/>
             </a:lvl2pPr>
-            <a:lvl3pPr marL="914400" indent="0">
-              <a:buNone/>
-              <a:defRPr sz="1000"/>
+            <a:lvl3pPr marL="4389120" indent="0">
+              <a:buNone/>
+              <a:defRPr sz="4800"/>
             </a:lvl3pPr>
-            <a:lvl4pPr marL="1371600" indent="0">
-              <a:buNone/>
-              <a:defRPr sz="900"/>
+            <a:lvl4pPr marL="6583680" indent="0">
+              <a:buNone/>
+              <a:defRPr sz="4300"/>
             </a:lvl4pPr>
-            <a:lvl5pPr marL="1828800" indent="0">
-              <a:buNone/>
-              <a:defRPr sz="900"/>
+            <a:lvl5pPr marL="8778240" indent="0">
+              <a:buNone/>
+              <a:defRPr sz="4300"/>
             </a:lvl5pPr>
-            <a:lvl6pPr marL="2286000" indent="0">
-              <a:buNone/>
-              <a:defRPr sz="900"/>
+            <a:lvl6pPr marL="10972800" indent="0">
+              <a:buNone/>
+              <a:defRPr sz="4300"/>
             </a:lvl6pPr>
-            <a:lvl7pPr marL="2743200" indent="0">
-              <a:buNone/>
-              <a:defRPr sz="900"/>
+            <a:lvl7pPr marL="13167360" indent="0">
+              <a:buNone/>
+              <a:defRPr sz="4300"/>
             </a:lvl7pPr>
-            <a:lvl8pPr marL="3200400" indent="0">
-              <a:buNone/>
-              <a:defRPr sz="900"/>
+            <a:lvl8pPr marL="15361920" indent="0">
+              <a:buNone/>
+              <a:defRPr sz="4300"/>
             </a:lvl8pPr>
-            <a:lvl9pPr marL="3657600" indent="0">
-              <a:buNone/>
-              <a:defRPr sz="900"/>
+            <a:lvl9pPr marL="17556480" indent="0">
+              <a:buNone/>
+              <a:defRPr sz="4300"/>
             </a:lvl9pPr>
           </a:lstStyle>
           <a:p>
@@ -2507,7 +2507,7 @@
           <a:p>
             <a:fld id="{6B197C2D-8723-A245-B450-88D2DFD389DA}" type="datetimeFigureOut">
               <a:rPr lang="en-US" smtClean="0"/>
-              <a:t>4/7/13</a:t>
+              <a:t>4/18/2013</a:t>
             </a:fld>
             <a:endParaRPr lang="en-US"/>
           </a:p>
@@ -2602,15 +2602,15 @@
         </p:nvSpPr>
         <p:spPr>
           <a:xfrm>
-            <a:off x="457200" y="274638"/>
-            <a:ext cx="8229600" cy="1143000"/>
+            <a:off x="2194560" y="1318262"/>
+            <a:ext cx="39502080" cy="5486400"/>
           </a:xfrm>
           <a:prstGeom prst="rect">
             <a:avLst/>
           </a:prstGeom>
         </p:spPr>
         <p:txBody>
-          <a:bodyPr vert="horz" lIns="91440" tIns="45720" rIns="91440" bIns="45720" rtlCol="0" anchor="ctr">
+          <a:bodyPr vert="horz" lIns="438912" tIns="219456" rIns="438912" bIns="219456" rtlCol="0" anchor="ctr">
             <a:normAutofit/>
           </a:bodyPr>
           <a:lstStyle/>
@@ -2635,15 +2635,15 @@
         </p:nvSpPr>
         <p:spPr>
           <a:xfrm>
-            <a:off x="457200" y="1600200"/>
-            <a:ext cx="8229600" cy="4525963"/>
+            <a:off x="2194560" y="7680963"/>
+            <a:ext cx="39502080" cy="21724622"/>
           </a:xfrm>
           <a:prstGeom prst="rect">
             <a:avLst/>
           </a:prstGeom>
         </p:spPr>
         <p:txBody>
-          <a:bodyPr vert="horz" lIns="91440" tIns="45720" rIns="91440" bIns="45720" rtlCol="0">
+          <a:bodyPr vert="horz" lIns="438912" tIns="219456" rIns="438912" bIns="219456" rtlCol="0">
             <a:normAutofit/>
           </a:bodyPr>
           <a:lstStyle/>
@@ -2697,18 +2697,18 @@
         </p:nvSpPr>
         <p:spPr>
           <a:xfrm>
-            <a:off x="457200" y="6356350"/>
-            <a:ext cx="2133600" cy="365125"/>
+            <a:off x="2194560" y="30510482"/>
+            <a:ext cx="10241280" cy="1752600"/>
           </a:xfrm>
           <a:prstGeom prst="rect">
             <a:avLst/>
           </a:prstGeom>
         </p:spPr>
         <p:txBody>
-          <a:bodyPr vert="horz" lIns="91440" tIns="45720" rIns="91440" bIns="45720" rtlCol="0" anchor="ctr"/>
+          <a:bodyPr vert="horz" lIns="438912" tIns="219456" rIns="438912" bIns="219456" rtlCol="0" anchor="ctr"/>
           <a:lstStyle>
             <a:lvl1pPr algn="l">
-              <a:defRPr sz="1200">
+              <a:defRPr sz="5800">
                 <a:solidFill>
                   <a:schemeClr val="tx1">
                     <a:tint val="75000"/>
@@ -2720,7 +2720,7 @@
           <a:p>
             <a:fld id="{6B197C2D-8723-A245-B450-88D2DFD389DA}" type="datetimeFigureOut">
               <a:rPr lang="en-US" smtClean="0"/>
-              <a:t>4/7/13</a:t>
+              <a:t>4/18/2013</a:t>
             </a:fld>
             <a:endParaRPr lang="en-US"/>
           </a:p>
@@ -2738,18 +2738,18 @@
         </p:nvSpPr>
         <p:spPr>
           <a:xfrm>
-            <a:off x="3124200" y="6356350"/>
-            <a:ext cx="2895600" cy="365125"/>
+            <a:off x="14996160" y="30510482"/>
+            <a:ext cx="13898880" cy="1752600"/>
           </a:xfrm>
           <a:prstGeom prst="rect">
             <a:avLst/>
           </a:prstGeom>
         </p:spPr>
         <p:txBody>
-          <a:bodyPr vert="horz" lIns="91440" tIns="45720" rIns="91440" bIns="45720" rtlCol="0" anchor="ctr"/>
+          <a:bodyPr vert="horz" lIns="438912" tIns="219456" rIns="438912" bIns="219456" rtlCol="0" anchor="ctr"/>
           <a:lstStyle>
             <a:lvl1pPr algn="ctr">
-              <a:defRPr sz="1200">
+              <a:defRPr sz="5800">
                 <a:solidFill>
                   <a:schemeClr val="tx1">
                     <a:tint val="75000"/>
@@ -2775,18 +2775,18 @@
         </p:nvSpPr>
         <p:spPr>
           <a:xfrm>
-            <a:off x="6553200" y="6356350"/>
-            <a:ext cx="2133600" cy="365125"/>
+            <a:off x="31455360" y="30510482"/>
+            <a:ext cx="10241280" cy="1752600"/>
           </a:xfrm>
           <a:prstGeom prst="rect">
             <a:avLst/>
           </a:prstGeom>
         </p:spPr>
         <p:txBody>
-          <a:bodyPr vert="horz" lIns="91440" tIns="45720" rIns="91440" bIns="45720" rtlCol="0" anchor="ctr"/>
+          <a:bodyPr vert="horz" lIns="438912" tIns="219456" rIns="438912" bIns="219456" rtlCol="0" anchor="ctr"/>
           <a:lstStyle>
             <a:lvl1pPr algn="r">
-              <a:defRPr sz="1200">
+              <a:defRPr sz="5800">
                 <a:solidFill>
                   <a:schemeClr val="tx1">
                     <a:tint val="75000"/>
@@ -2827,12 +2827,12 @@
   </p:sldLayoutIdLst>
   <p:txStyles>
     <p:titleStyle>
-      <a:lvl1pPr algn="ctr" defTabSz="457200" rtl="0" eaLnBrk="1" latinLnBrk="0" hangingPunct="1">
+      <a:lvl1pPr algn="ctr" defTabSz="2194560" rtl="0" eaLnBrk="1" latinLnBrk="0" hangingPunct="1">
         <a:spcBef>
           <a:spcPct val="0"/>
         </a:spcBef>
         <a:buNone/>
-        <a:defRPr sz="4400" kern="1200">
+        <a:defRPr sz="21100" kern="1200">
           <a:solidFill>
             <a:schemeClr val="tx1"/>
           </a:solidFill>
@@ -2843,13 +2843,13 @@
       </a:lvl1pPr>
     </p:titleStyle>
     <p:bodyStyle>
-      <a:lvl1pPr marL="342900" indent="-342900" algn="l" defTabSz="457200" rtl="0" eaLnBrk="1" latinLnBrk="0" hangingPunct="1">
+      <a:lvl1pPr marL="1645920" indent="-1645920" algn="l" defTabSz="2194560" rtl="0" eaLnBrk="1" latinLnBrk="0" hangingPunct="1">
         <a:spcBef>
           <a:spcPct val="20000"/>
         </a:spcBef>
         <a:buFont typeface="Arial"/>
         <a:buChar char="•"/>
-        <a:defRPr sz="3200" kern="1200">
+        <a:defRPr sz="15400" kern="1200">
           <a:solidFill>
             <a:schemeClr val="tx1"/>
           </a:solidFill>
@@ -2858,13 +2858,13 @@
           <a:cs typeface="+mn-cs"/>
         </a:defRPr>
       </a:lvl1pPr>
-      <a:lvl2pPr marL="742950" indent="-285750" algn="l" defTabSz="457200" rtl="0" eaLnBrk="1" latinLnBrk="0" hangingPunct="1">
+      <a:lvl2pPr marL="3566160" indent="-1371600" algn="l" defTabSz="2194560" rtl="0" eaLnBrk="1" latinLnBrk="0" hangingPunct="1">
         <a:spcBef>
           <a:spcPct val="20000"/>
         </a:spcBef>
         <a:buFont typeface="Arial"/>
         <a:buChar char="–"/>
-        <a:defRPr sz="2800" kern="1200">
+        <a:defRPr sz="13400" kern="1200">
           <a:solidFill>
             <a:schemeClr val="tx1"/>
           </a:solidFill>
@@ -2873,13 +2873,13 @@
           <a:cs typeface="+mn-cs"/>
         </a:defRPr>
       </a:lvl2pPr>
-      <a:lvl3pPr marL="1143000" indent="-228600" algn="l" defTabSz="457200" rtl="0" eaLnBrk="1" latinLnBrk="0" hangingPunct="1">
+      <a:lvl3pPr marL="5486400" indent="-1097280" algn="l" defTabSz="2194560" rtl="0" eaLnBrk="1" latinLnBrk="0" hangingPunct="1">
         <a:spcBef>
           <a:spcPct val="20000"/>
         </a:spcBef>
         <a:buFont typeface="Arial"/>
         <a:buChar char="•"/>
-        <a:defRPr sz="2400" kern="1200">
+        <a:defRPr sz="11500" kern="1200">
           <a:solidFill>
             <a:schemeClr val="tx1"/>
           </a:solidFill>
@@ -2888,13 +2888,13 @@
           <a:cs typeface="+mn-cs"/>
         </a:defRPr>
       </a:lvl3pPr>
-      <a:lvl4pPr marL="1600200" indent="-228600" algn="l" defTabSz="457200" rtl="0" eaLnBrk="1" latinLnBrk="0" hangingPunct="1">
+      <a:lvl4pPr marL="7680960" indent="-1097280" algn="l" defTabSz="2194560" rtl="0" eaLnBrk="1" latinLnBrk="0" hangingPunct="1">
         <a:spcBef>
           <a:spcPct val="20000"/>
         </a:spcBef>
         <a:buFont typeface="Arial"/>
         <a:buChar char="–"/>
-        <a:defRPr sz="2000" kern="1200">
+        <a:defRPr sz="9600" kern="1200">
           <a:solidFill>
             <a:schemeClr val="tx1"/>
           </a:solidFill>
@@ -2903,13 +2903,13 @@
           <a:cs typeface="+mn-cs"/>
         </a:defRPr>
       </a:lvl4pPr>
-      <a:lvl5pPr marL="2057400" indent="-228600" algn="l" defTabSz="457200" rtl="0" eaLnBrk="1" latinLnBrk="0" hangingPunct="1">
+      <a:lvl5pPr marL="9875520" indent="-1097280" algn="l" defTabSz="2194560" rtl="0" eaLnBrk="1" latinLnBrk="0" hangingPunct="1">
         <a:spcBef>
           <a:spcPct val="20000"/>
         </a:spcBef>
         <a:buFont typeface="Arial"/>
         <a:buChar char="»"/>
-        <a:defRPr sz="2000" kern="1200">
+        <a:defRPr sz="9600" kern="1200">
           <a:solidFill>
             <a:schemeClr val="tx1"/>
           </a:solidFill>
@@ -2918,13 +2918,13 @@
           <a:cs typeface="+mn-cs"/>
         </a:defRPr>
       </a:lvl5pPr>
-      <a:lvl6pPr marL="2514600" indent="-228600" algn="l" defTabSz="457200" rtl="0" eaLnBrk="1" latinLnBrk="0" hangingPunct="1">
+      <a:lvl6pPr marL="12070080" indent="-1097280" algn="l" defTabSz="2194560" rtl="0" eaLnBrk="1" latinLnBrk="0" hangingPunct="1">
         <a:spcBef>
           <a:spcPct val="20000"/>
         </a:spcBef>
         <a:buFont typeface="Arial"/>
         <a:buChar char="•"/>
-        <a:defRPr sz="2000" kern="1200">
+        <a:defRPr sz="9600" kern="1200">
           <a:solidFill>
             <a:schemeClr val="tx1"/>
           </a:solidFill>
@@ -2933,13 +2933,13 @@
           <a:cs typeface="+mn-cs"/>
         </a:defRPr>
       </a:lvl6pPr>
-      <a:lvl7pPr marL="2971800" indent="-228600" algn="l" defTabSz="457200" rtl="0" eaLnBrk="1" latinLnBrk="0" hangingPunct="1">
+      <a:lvl7pPr marL="14264640" indent="-1097280" algn="l" defTabSz="2194560" rtl="0" eaLnBrk="1" latinLnBrk="0" hangingPunct="1">
         <a:spcBef>
           <a:spcPct val="20000"/>
         </a:spcBef>
         <a:buFont typeface="Arial"/>
         <a:buChar char="•"/>
-        <a:defRPr sz="2000" kern="1200">
+        <a:defRPr sz="9600" kern="1200">
           <a:solidFill>
             <a:schemeClr val="tx1"/>
           </a:solidFill>
@@ -2948,13 +2948,13 @@
           <a:cs typeface="+mn-cs"/>
         </a:defRPr>
       </a:lvl7pPr>
-      <a:lvl8pPr marL="3429000" indent="-228600" algn="l" defTabSz="457200" rtl="0" eaLnBrk="1" latinLnBrk="0" hangingPunct="1">
+      <a:lvl8pPr marL="16459200" indent="-1097280" algn="l" defTabSz="2194560" rtl="0" eaLnBrk="1" latinLnBrk="0" hangingPunct="1">
         <a:spcBef>
           <a:spcPct val="20000"/>
         </a:spcBef>
         <a:buFont typeface="Arial"/>
         <a:buChar char="•"/>
-        <a:defRPr sz="2000" kern="1200">
+        <a:defRPr sz="9600" kern="1200">
           <a:solidFill>
             <a:schemeClr val="tx1"/>
           </a:solidFill>
@@ -2963,13 +2963,13 @@
           <a:cs typeface="+mn-cs"/>
         </a:defRPr>
       </a:lvl8pPr>
-      <a:lvl9pPr marL="3886200" indent="-228600" algn="l" defTabSz="457200" rtl="0" eaLnBrk="1" latinLnBrk="0" hangingPunct="1">
+      <a:lvl9pPr marL="18653760" indent="-1097280" algn="l" defTabSz="2194560" rtl="0" eaLnBrk="1" latinLnBrk="0" hangingPunct="1">
         <a:spcBef>
           <a:spcPct val="20000"/>
         </a:spcBef>
         <a:buFont typeface="Arial"/>
         <a:buChar char="•"/>
-        <a:defRPr sz="2000" kern="1200">
+        <a:defRPr sz="9600" kern="1200">
           <a:solidFill>
             <a:schemeClr val="tx1"/>
           </a:solidFill>
@@ -2983,8 +2983,8 @@
       <a:defPPr>
         <a:defRPr lang="en-US"/>
       </a:defPPr>
-      <a:lvl1pPr marL="0" algn="l" defTabSz="457200" rtl="0" eaLnBrk="1" latinLnBrk="0" hangingPunct="1">
-        <a:defRPr sz="1800" kern="1200">
+      <a:lvl1pPr marL="0" algn="l" defTabSz="2194560" rtl="0" eaLnBrk="1" latinLnBrk="0" hangingPunct="1">
+        <a:defRPr sz="8600" kern="1200">
           <a:solidFill>
             <a:schemeClr val="tx1"/>
           </a:solidFill>
@@ -2993,8 +2993,8 @@
           <a:cs typeface="+mn-cs"/>
         </a:defRPr>
       </a:lvl1pPr>
-      <a:lvl2pPr marL="457200" algn="l" defTabSz="457200" rtl="0" eaLnBrk="1" latinLnBrk="0" hangingPunct="1">
-        <a:defRPr sz="1800" kern="1200">
+      <a:lvl2pPr marL="2194560" algn="l" defTabSz="2194560" rtl="0" eaLnBrk="1" latinLnBrk="0" hangingPunct="1">
+        <a:defRPr sz="8600" kern="1200">
           <a:solidFill>
             <a:schemeClr val="tx1"/>
           </a:solidFill>
@@ -3003,8 +3003,8 @@
           <a:cs typeface="+mn-cs"/>
         </a:defRPr>
       </a:lvl2pPr>
-      <a:lvl3pPr marL="914400" algn="l" defTabSz="457200" rtl="0" eaLnBrk="1" latinLnBrk="0" hangingPunct="1">
-        <a:defRPr sz="1800" kern="1200">
+      <a:lvl3pPr marL="4389120" algn="l" defTabSz="2194560" rtl="0" eaLnBrk="1" latinLnBrk="0" hangingPunct="1">
+        <a:defRPr sz="8600" kern="1200">
           <a:solidFill>
             <a:schemeClr val="tx1"/>
           </a:solidFill>
@@ -3013,8 +3013,8 @@
           <a:cs typeface="+mn-cs"/>
         </a:defRPr>
       </a:lvl3pPr>
-      <a:lvl4pPr marL="1371600" algn="l" defTabSz="457200" rtl="0" eaLnBrk="1" latinLnBrk="0" hangingPunct="1">
-        <a:defRPr sz="1800" kern="1200">
+      <a:lvl4pPr marL="6583680" algn="l" defTabSz="2194560" rtl="0" eaLnBrk="1" latinLnBrk="0" hangingPunct="1">
+        <a:defRPr sz="8600" kern="1200">
           <a:solidFill>
             <a:schemeClr val="tx1"/>
           </a:solidFill>
@@ -3023,8 +3023,8 @@
           <a:cs typeface="+mn-cs"/>
         </a:defRPr>
       </a:lvl4pPr>
-      <a:lvl5pPr marL="1828800" algn="l" defTabSz="457200" rtl="0" eaLnBrk="1" latinLnBrk="0" hangingPunct="1">
-        <a:defRPr sz="1800" kern="1200">
+      <a:lvl5pPr marL="8778240" algn="l" defTabSz="2194560" rtl="0" eaLnBrk="1" latinLnBrk="0" hangingPunct="1">
+        <a:defRPr sz="8600" kern="1200">
           <a:solidFill>
             <a:schemeClr val="tx1"/>
           </a:solidFill>
@@ -3033,8 +3033,8 @@
           <a:cs typeface="+mn-cs"/>
         </a:defRPr>
       </a:lvl5pPr>
-      <a:lvl6pPr marL="2286000" algn="l" defTabSz="457200" rtl="0" eaLnBrk="1" latinLnBrk="0" hangingPunct="1">
-        <a:defRPr sz="1800" kern="1200">
+      <a:lvl6pPr marL="10972800" algn="l" defTabSz="2194560" rtl="0" eaLnBrk="1" latinLnBrk="0" hangingPunct="1">
+        <a:defRPr sz="8600" kern="1200">
           <a:solidFill>
             <a:schemeClr val="tx1"/>
           </a:solidFill>
@@ -3043,8 +3043,8 @@
           <a:cs typeface="+mn-cs"/>
         </a:defRPr>
       </a:lvl6pPr>
-      <a:lvl7pPr marL="2743200" algn="l" defTabSz="457200" rtl="0" eaLnBrk="1" latinLnBrk="0" hangingPunct="1">
-        <a:defRPr sz="1800" kern="1200">
+      <a:lvl7pPr marL="13167360" algn="l" defTabSz="2194560" rtl="0" eaLnBrk="1" latinLnBrk="0" hangingPunct="1">
+        <a:defRPr sz="8600" kern="1200">
           <a:solidFill>
             <a:schemeClr val="tx1"/>
           </a:solidFill>
@@ -3053,8 +3053,8 @@
           <a:cs typeface="+mn-cs"/>
         </a:defRPr>
       </a:lvl7pPr>
-      <a:lvl8pPr marL="3200400" algn="l" defTabSz="457200" rtl="0" eaLnBrk="1" latinLnBrk="0" hangingPunct="1">
-        <a:defRPr sz="1800" kern="1200">
+      <a:lvl8pPr marL="15361920" algn="l" defTabSz="2194560" rtl="0" eaLnBrk="1" latinLnBrk="0" hangingPunct="1">
+        <a:defRPr sz="8600" kern="1200">
           <a:solidFill>
             <a:schemeClr val="tx1"/>
           </a:solidFill>
@@ -3063,8 +3063,8 @@
           <a:cs typeface="+mn-cs"/>
         </a:defRPr>
       </a:lvl8pPr>
-      <a:lvl9pPr marL="3657600" algn="l" defTabSz="457200" rtl="0" eaLnBrk="1" latinLnBrk="0" hangingPunct="1">
-        <a:defRPr sz="1800" kern="1200">
+      <a:lvl9pPr marL="17556480" algn="l" defTabSz="2194560" rtl="0" eaLnBrk="1" latinLnBrk="0" hangingPunct="1">
+        <a:defRPr sz="8600" kern="1200">
           <a:solidFill>
             <a:schemeClr val="tx1"/>
           </a:solidFill>
@@ -3104,7 +3104,7 @@
         <p:spPr>
           <a:xfrm>
             <a:off x="0" y="0"/>
-            <a:ext cx="9144000" cy="6858000"/>
+            <a:ext cx="43891200" cy="32918400"/>
           </a:xfrm>
           <a:prstGeom prst="rect">
             <a:avLst/>
@@ -3139,7 +3139,7 @@
           </a:fontRef>
         </p:style>
         <p:txBody>
-          <a:bodyPr rtlCol="0" anchor="ctr"/>
+          <a:bodyPr lIns="438912" tIns="219456" rIns="438912" bIns="219456" rtlCol="0" anchor="ctr"/>
           <a:lstStyle/>
           <a:p>
             <a:pPr algn="ctr"/>
@@ -3155,8 +3155,8 @@
         </p:nvSpPr>
         <p:spPr>
           <a:xfrm>
-            <a:off x="2587752" y="4791456"/>
-            <a:ext cx="6510528" cy="2020824"/>
+            <a:off x="12421210" y="22998989"/>
+            <a:ext cx="31250534" cy="9699955"/>
           </a:xfrm>
           <a:prstGeom prst="roundRect">
             <a:avLst>
@@ -3187,7 +3187,7 @@
           </a:fontRef>
         </p:style>
         <p:txBody>
-          <a:bodyPr rtlCol="0" anchor="ctr"/>
+          <a:bodyPr lIns="438912" tIns="219456" rIns="438912" bIns="219456" rtlCol="0" anchor="ctr"/>
           <a:lstStyle/>
           <a:p>
             <a:pPr algn="ctr"/>
@@ -3207,8 +3207,8 @@
         </p:nvSpPr>
         <p:spPr>
           <a:xfrm>
-            <a:off x="47745" y="47740"/>
-            <a:ext cx="6510528" cy="2020824"/>
+            <a:off x="229176" y="229152"/>
+            <a:ext cx="31250534" cy="9699955"/>
           </a:xfrm>
           <a:prstGeom prst="roundRect">
             <a:avLst>
@@ -3240,7 +3240,7 @@
           </a:fontRef>
         </p:style>
         <p:txBody>
-          <a:bodyPr rtlCol="0" anchor="ctr"/>
+          <a:bodyPr lIns="438912" tIns="219456" rIns="438912" bIns="219456" rtlCol="0" anchor="ctr"/>
           <a:lstStyle/>
           <a:p>
             <a:pPr algn="ctr"/>
@@ -3260,8 +3260,8 @@
         </p:nvSpPr>
         <p:spPr>
           <a:xfrm>
-            <a:off x="47745" y="2110244"/>
-            <a:ext cx="2496312" cy="4700016"/>
+            <a:off x="229176" y="10129171"/>
+            <a:ext cx="11982298" cy="22560077"/>
           </a:xfrm>
           <a:prstGeom prst="roundRect">
             <a:avLst>
@@ -3292,7 +3292,7 @@
           </a:fontRef>
         </p:style>
         <p:txBody>
-          <a:bodyPr rtlCol="0" anchor="ctr"/>
+          <a:bodyPr lIns="438912" tIns="219456" rIns="438912" bIns="219456" rtlCol="0" anchor="ctr"/>
           <a:lstStyle/>
           <a:p>
             <a:pPr algn="ctr"/>
@@ -3312,8 +3312,8 @@
         </p:nvSpPr>
         <p:spPr>
           <a:xfrm>
-            <a:off x="6599943" y="47740"/>
-            <a:ext cx="2496312" cy="4700016"/>
+            <a:off x="31679726" y="229152"/>
+            <a:ext cx="11982298" cy="22560077"/>
           </a:xfrm>
           <a:prstGeom prst="roundRect">
             <a:avLst>
@@ -3344,7 +3344,7 @@
           </a:fontRef>
         </p:style>
         <p:txBody>
-          <a:bodyPr rtlCol="0" anchor="ctr"/>
+          <a:bodyPr lIns="438912" tIns="219456" rIns="438912" bIns="219456" rtlCol="0" anchor="ctr"/>
           <a:lstStyle/>
           <a:p>
             <a:pPr algn="ctr"/>
@@ -3364,8 +3364,8 @@
         </p:nvSpPr>
         <p:spPr>
           <a:xfrm>
-            <a:off x="2589777" y="2110244"/>
-            <a:ext cx="3968496" cy="2633472"/>
+            <a:off x="12430930" y="10129171"/>
+            <a:ext cx="19048781" cy="12640666"/>
           </a:xfrm>
           <a:prstGeom prst="roundRect">
             <a:avLst>
@@ -3396,7 +3396,7 @@
           </a:fontRef>
         </p:style>
         <p:txBody>
-          <a:bodyPr rtlCol="0" anchor="ctr"/>
+          <a:bodyPr lIns="438912" tIns="219456" rIns="438912" bIns="219456" rtlCol="0" anchor="ctr"/>
           <a:lstStyle/>
           <a:p>
             <a:pPr algn="ctr"/>
@@ -3430,8 +3430,8 @@
         </p:blipFill>
         <p:spPr>
           <a:xfrm>
-            <a:off x="142949" y="324609"/>
-            <a:ext cx="2237211" cy="1279676"/>
+            <a:off x="686158" y="1558123"/>
+            <a:ext cx="10738613" cy="6142445"/>
           </a:xfrm>
           <a:prstGeom prst="rect">
             <a:avLst/>
@@ -3446,8 +3446,8 @@
         </p:nvSpPr>
         <p:spPr>
           <a:xfrm>
-            <a:off x="1974779" y="1266037"/>
-            <a:ext cx="1419339" cy="646331"/>
+            <a:off x="9478942" y="6076980"/>
+            <a:ext cx="6812827" cy="3102389"/>
           </a:xfrm>
           <a:prstGeom prst="rect">
             <a:avLst/>
@@ -3455,13 +3455,13 @@
           <a:noFill/>
         </p:spPr>
         <p:txBody>
-          <a:bodyPr wrap="square" rtlCol="0">
+          <a:bodyPr wrap="square" lIns="438912" tIns="219456" rIns="438912" bIns="219456" rtlCol="0">
             <a:spAutoFit/>
           </a:bodyPr>
           <a:lstStyle/>
           <a:p>
             <a:r>
-              <a:rPr lang="en-US" sz="1200" dirty="0" smtClean="0">
+              <a:rPr lang="en-US" sz="5800" dirty="0">
                 <a:latin typeface="Times"/>
                 <a:cs typeface="Times"/>
               </a:rPr>
@@ -3470,7 +3470,7 @@
           </a:p>
           <a:p>
             <a:r>
-              <a:rPr lang="en-US" sz="1200" dirty="0" smtClean="0">
+              <a:rPr lang="en-US" sz="5800" dirty="0">
                 <a:latin typeface="Times"/>
                 <a:cs typeface="Times"/>
               </a:rPr>
@@ -3479,13 +3479,13 @@
           </a:p>
           <a:p>
             <a:r>
-              <a:rPr lang="en-US" sz="1200" dirty="0" smtClean="0">
+              <a:rPr lang="en-US" sz="5800" dirty="0">
                 <a:latin typeface="Times"/>
                 <a:cs typeface="Times"/>
               </a:rPr>
               <a:t>Jeremy Warner</a:t>
             </a:r>
-            <a:endParaRPr lang="en-US" sz="1200" dirty="0">
+            <a:endParaRPr lang="en-US" sz="5800" dirty="0">
               <a:latin typeface="Times"/>
               <a:cs typeface="Times"/>
             </a:endParaRPr>
@@ -3500,8 +3500,8 @@
         </p:nvSpPr>
         <p:spPr>
           <a:xfrm>
-            <a:off x="3634304" y="1266037"/>
-            <a:ext cx="2423042" cy="646331"/>
+            <a:off x="17444659" y="6076980"/>
+            <a:ext cx="11630602" cy="3102389"/>
           </a:xfrm>
           <a:prstGeom prst="rect">
             <a:avLst/>
@@ -3509,42 +3509,42 @@
           <a:noFill/>
         </p:spPr>
         <p:txBody>
-          <a:bodyPr wrap="square" rtlCol="0">
+          <a:bodyPr wrap="square" lIns="438912" tIns="219456" rIns="438912" bIns="219456" rtlCol="0">
             <a:spAutoFit/>
           </a:bodyPr>
           <a:lstStyle/>
           <a:p>
             <a:r>
-              <a:rPr lang="en-US" sz="1200" i="1" dirty="0" smtClean="0">
+              <a:rPr lang="en-US" sz="5800" i="1" dirty="0">
                 <a:latin typeface="Times"/>
                 <a:cs typeface="Times"/>
               </a:rPr>
               <a:t>Special Thanks To…</a:t>
             </a:r>
             <a:r>
-              <a:rPr lang="en-US" sz="1200" dirty="0" smtClean="0">
+              <a:rPr lang="en-US" sz="5800" dirty="0">
                 <a:latin typeface="Times"/>
                 <a:cs typeface="Times"/>
               </a:rPr>
               <a:t/>
             </a:r>
             <a:br>
-              <a:rPr lang="en-US" sz="1200" dirty="0" smtClean="0">
+              <a:rPr lang="en-US" sz="5800" dirty="0">
                 <a:latin typeface="Times"/>
                 <a:cs typeface="Times"/>
               </a:rPr>
             </a:br>
             <a:r>
-              <a:rPr lang="en-US" sz="1200" dirty="0" smtClean="0">
+              <a:rPr lang="en-US" sz="5800" dirty="0">
                 <a:latin typeface="Times"/>
                 <a:cs typeface="Times"/>
               </a:rPr>
-              <a:t>Brain Butterfield      Chris Ortman</a:t>
-            </a:r>
-          </a:p>
-          <a:p>
-            <a:r>
-              <a:rPr lang="en-US" sz="1200" dirty="0" smtClean="0">
+              <a:t>Brian Butterfield      Chris Ortman</a:t>
+            </a:r>
+          </a:p>
+          <a:p>
+            <a:r>
+              <a:rPr lang="en-US" sz="5800" dirty="0">
                 <a:latin typeface="Times"/>
                 <a:cs typeface="Times"/>
               </a:rPr>
@@ -3575,8 +3575,8 @@
         </p:blipFill>
         <p:spPr>
           <a:xfrm>
-            <a:off x="4510222" y="115887"/>
-            <a:ext cx="2067171" cy="565347"/>
+            <a:off x="21649068" y="556260"/>
+            <a:ext cx="9922421" cy="2713666"/>
           </a:xfrm>
           <a:prstGeom prst="rect">
             <a:avLst/>
@@ -3598,8 +3598,8 @@
         </p:nvSpPr>
         <p:spPr>
           <a:xfrm>
-            <a:off x="734750" y="2267028"/>
-            <a:ext cx="1253618" cy="369332"/>
+            <a:off x="3526800" y="10881734"/>
+            <a:ext cx="6017366" cy="1772794"/>
           </a:xfrm>
           <a:prstGeom prst="rect">
             <a:avLst/>
@@ -3607,7 +3607,7 @@
           <a:noFill/>
         </p:spPr>
         <p:txBody>
-          <a:bodyPr wrap="none" rtlCol="0">
+          <a:bodyPr wrap="none" lIns="438912" tIns="219456" rIns="438912" bIns="219456" rtlCol="0">
             <a:spAutoFit/>
           </a:bodyPr>
           <a:lstStyle/>
@@ -3630,8 +3630,8 @@
         </p:nvSpPr>
         <p:spPr>
           <a:xfrm>
-            <a:off x="7264401" y="198344"/>
-            <a:ext cx="1444173" cy="369332"/>
+            <a:off x="34869127" y="952051"/>
+            <a:ext cx="6932030" cy="1772794"/>
           </a:xfrm>
           <a:prstGeom prst="rect">
             <a:avLst/>
@@ -3639,7 +3639,7 @@
           <a:noFill/>
         </p:spPr>
         <p:txBody>
-          <a:bodyPr wrap="square" rtlCol="0">
+          <a:bodyPr wrap="square" lIns="438912" tIns="219456" rIns="438912" bIns="219456" rtlCol="0">
             <a:spAutoFit/>
           </a:bodyPr>
           <a:lstStyle/>
@@ -3676,8 +3676,8 @@
         </p:blipFill>
         <p:spPr>
           <a:xfrm>
-            <a:off x="6660767" y="111669"/>
-            <a:ext cx="592701" cy="592701"/>
+            <a:off x="31971684" y="536014"/>
+            <a:ext cx="2844965" cy="2844965"/>
           </a:xfrm>
           <a:prstGeom prst="rect">
             <a:avLst/>
@@ -3713,8 +3713,8 @@
         </p:blipFill>
         <p:spPr>
           <a:xfrm>
-            <a:off x="110004" y="2172498"/>
-            <a:ext cx="594360" cy="594360"/>
+            <a:off x="528019" y="10427990"/>
+            <a:ext cx="2852928" cy="2852928"/>
           </a:xfrm>
           <a:prstGeom prst="rect">
             <a:avLst/>
@@ -3750,8 +3750,8 @@
         </p:blipFill>
         <p:spPr>
           <a:xfrm>
-            <a:off x="1429416" y="2857234"/>
-            <a:ext cx="1028700" cy="1828800"/>
+            <a:off x="6861197" y="13714723"/>
+            <a:ext cx="4937760" cy="8778240"/>
           </a:xfrm>
           <a:prstGeom prst="rect">
             <a:avLst/>
@@ -3787,8 +3787,8 @@
         </p:blipFill>
         <p:spPr>
           <a:xfrm>
-            <a:off x="7987746" y="778404"/>
-            <a:ext cx="1028700" cy="1828800"/>
+            <a:off x="38341181" y="3736339"/>
+            <a:ext cx="4937760" cy="8778240"/>
           </a:xfrm>
           <a:prstGeom prst="rect">
             <a:avLst/>
@@ -3824,8 +3824,8 @@
         </p:blipFill>
         <p:spPr>
           <a:xfrm>
-            <a:off x="6675477" y="919865"/>
-            <a:ext cx="1219200" cy="1828800"/>
+            <a:off x="32042290" y="4415352"/>
+            <a:ext cx="5852160" cy="8778240"/>
           </a:xfrm>
           <a:prstGeom prst="rect">
             <a:avLst/>
@@ -3861,8 +3861,8 @@
         </p:blipFill>
         <p:spPr>
           <a:xfrm>
-            <a:off x="119172" y="3002374"/>
-            <a:ext cx="1219200" cy="1828800"/>
+            <a:off x="572026" y="14411395"/>
+            <a:ext cx="5852160" cy="8778240"/>
           </a:xfrm>
           <a:prstGeom prst="rect">
             <a:avLst/>
@@ -3884,8 +3884,8 @@
         </p:nvSpPr>
         <p:spPr>
           <a:xfrm>
-            <a:off x="4148523" y="2158073"/>
-            <a:ext cx="954258" cy="369332"/>
+            <a:off x="19912911" y="10358750"/>
+            <a:ext cx="4580438" cy="1772794"/>
           </a:xfrm>
           <a:prstGeom prst="rect">
             <a:avLst/>
@@ -3893,7 +3893,7 @@
           <a:noFill/>
         </p:spPr>
         <p:txBody>
-          <a:bodyPr wrap="none" rtlCol="0">
+          <a:bodyPr wrap="none" lIns="438912" tIns="219456" rIns="438912" bIns="219456" rtlCol="0">
             <a:spAutoFit/>
           </a:bodyPr>
           <a:lstStyle/>
@@ -3920,8 +3920,8 @@
         </p:nvSpPr>
         <p:spPr>
           <a:xfrm>
-            <a:off x="2662348" y="2526169"/>
-            <a:ext cx="3832793" cy="1477328"/>
+            <a:off x="12779273" y="12125611"/>
+            <a:ext cx="18397406" cy="7091174"/>
           </a:xfrm>
           <a:prstGeom prst="rect">
             <a:avLst/>
@@ -3929,17 +3929,17 @@
           <a:noFill/>
         </p:spPr>
         <p:txBody>
-          <a:bodyPr wrap="square" rtlCol="0">
+          <a:bodyPr wrap="square" lIns="438912" tIns="219456" rIns="438912" bIns="219456" rtlCol="0">
             <a:spAutoFit/>
           </a:bodyPr>
           <a:lstStyle/>
           <a:p>
-            <a:pPr marL="228600" indent="-228600">
+            <a:pPr marL="1097280" indent="-1097280">
               <a:buFont typeface="+mj-lt"/>
               <a:buAutoNum type="arabicPeriod"/>
             </a:pPr>
             <a:r>
-              <a:rPr lang="en-US" sz="1200" dirty="0" smtClean="0">
+              <a:rPr lang="en-US" sz="5800" dirty="0">
                 <a:latin typeface="Times"/>
                 <a:cs typeface="Times"/>
               </a:rPr>
@@ -3947,36 +3947,36 @@
             </a:r>
           </a:p>
           <a:p>
-            <a:pPr marL="228600" indent="-228600">
+            <a:pPr marL="1097280" indent="-1097280">
               <a:buFont typeface="+mj-lt"/>
               <a:buAutoNum type="arabicPeriod"/>
             </a:pPr>
-            <a:endParaRPr lang="en-US" sz="1200" dirty="0" smtClean="0">
+            <a:endParaRPr lang="en-US" sz="5800" dirty="0">
               <a:latin typeface="Times"/>
               <a:cs typeface="Times"/>
             </a:endParaRPr>
           </a:p>
           <a:p>
-            <a:pPr marL="228600" indent="-228600">
+            <a:pPr marL="1097280" indent="-1097280">
               <a:buFont typeface="+mj-lt"/>
               <a:buAutoNum type="arabicPeriod"/>
             </a:pPr>
             <a:r>
-              <a:rPr lang="en-US" sz="1200" dirty="0" smtClean="0">
+              <a:rPr lang="en-US" sz="5800" dirty="0">
                 <a:latin typeface="Times"/>
                 <a:cs typeface="Times"/>
               </a:rPr>
               <a:t>Develop a mobile application to assist </a:t>
             </a:r>
             <a:r>
-              <a:rPr lang="en-US" sz="1200" dirty="0">
+              <a:rPr lang="en-US" sz="5800" dirty="0">
                 <a:latin typeface="Times"/>
                 <a:cs typeface="Times"/>
               </a:rPr>
               <a:t>s</a:t>
             </a:r>
             <a:r>
-              <a:rPr lang="en-US" sz="1200" dirty="0" smtClean="0">
+              <a:rPr lang="en-US" sz="5800" dirty="0">
                 <a:latin typeface="Times"/>
                 <a:cs typeface="Times"/>
               </a:rPr>
@@ -3996,8 +3996,8 @@
         </p:nvSpPr>
         <p:spPr>
           <a:xfrm>
-            <a:off x="2703041" y="3900119"/>
-            <a:ext cx="1700010" cy="461665"/>
+            <a:off x="12974597" y="18720574"/>
+            <a:ext cx="8160048" cy="2215992"/>
           </a:xfrm>
           <a:prstGeom prst="rect">
             <a:avLst/>
@@ -4005,7 +4005,7 @@
           <a:noFill/>
         </p:spPr>
         <p:txBody>
-          <a:bodyPr wrap="square" rtlCol="0">
+          <a:bodyPr wrap="square" lIns="438912" tIns="219456" rIns="438912" bIns="219456" rtlCol="0">
             <a:spAutoFit/>
           </a:bodyPr>
           <a:lstStyle/>
@@ -4017,13 +4017,13 @@
               <a:buSzPct val="75000"/>
             </a:pPr>
             <a:r>
-              <a:rPr lang="en-US" sz="1200" dirty="0" smtClean="0">
+              <a:rPr lang="en-US" sz="5800" dirty="0">
                 <a:latin typeface="Times"/>
                 <a:cs typeface="Times"/>
               </a:rPr>
               <a:t>Existing eLation eBill Web Application:</a:t>
             </a:r>
-            <a:endParaRPr lang="en-US" sz="1200" dirty="0">
+            <a:endParaRPr lang="en-US" sz="5800" dirty="0">
               <a:latin typeface="Times"/>
               <a:cs typeface="Times"/>
             </a:endParaRPr>
@@ -4052,8 +4052,8 @@
         </p:blipFill>
         <p:spPr>
           <a:xfrm>
-            <a:off x="4394110" y="3616247"/>
-            <a:ext cx="2035720" cy="1049179"/>
+            <a:off x="21091728" y="17357988"/>
+            <a:ext cx="9771456" cy="5036059"/>
           </a:xfrm>
           <a:prstGeom prst="rect">
             <a:avLst/>
@@ -4078,8 +4078,8 @@
         </p:nvSpPr>
         <p:spPr>
           <a:xfrm>
-            <a:off x="6741644" y="2953032"/>
-            <a:ext cx="2227284" cy="1292662"/>
+            <a:off x="32359891" y="14174553"/>
+            <a:ext cx="10231583" cy="6229398"/>
           </a:xfrm>
           <a:prstGeom prst="rect">
             <a:avLst/>
@@ -4087,7 +4087,7 @@
           <a:noFill/>
         </p:spPr>
         <p:txBody>
-          <a:bodyPr wrap="none" rtlCol="0">
+          <a:bodyPr wrap="none" lIns="438912" tIns="219456" rIns="438912" bIns="219456" rtlCol="0">
             <a:spAutoFit/>
           </a:bodyPr>
           <a:lstStyle/>
@@ -4098,7 +4098,7 @@
             </a:endParaRPr>
           </a:p>
           <a:p>
-            <a:pPr marL="171450" indent="-171450">
+            <a:pPr marL="822960" indent="-822960">
               <a:buClr>
                 <a:srgbClr val="991132"/>
               </a:buClr>
@@ -4107,7 +4107,7 @@
               <a:buChar char="v"/>
             </a:pPr>
             <a:r>
-              <a:rPr lang="en-US" sz="1200" dirty="0" smtClean="0">
+              <a:rPr lang="en-US" sz="5800" dirty="0">
                 <a:latin typeface="Times"/>
                 <a:cs typeface="Times"/>
               </a:rPr>
@@ -4115,7 +4115,7 @@
             </a:r>
           </a:p>
           <a:p>
-            <a:pPr marL="171450" indent="-171450">
+            <a:pPr marL="822960" indent="-822960">
               <a:buClr>
                 <a:srgbClr val="991132"/>
               </a:buClr>
@@ -4124,7 +4124,7 @@
               <a:buChar char="v"/>
             </a:pPr>
             <a:r>
-              <a:rPr lang="en-US" sz="1200" dirty="0" smtClean="0">
+              <a:rPr lang="en-US" sz="5800" dirty="0">
                 <a:latin typeface="Times"/>
                 <a:cs typeface="Times"/>
               </a:rPr>
@@ -4132,7 +4132,7 @@
             </a:r>
           </a:p>
           <a:p>
-            <a:pPr marL="171450" indent="-171450">
+            <a:pPr marL="822960" indent="-822960">
               <a:buClr>
                 <a:srgbClr val="991132"/>
               </a:buClr>
@@ -4141,7 +4141,7 @@
               <a:buChar char="v"/>
             </a:pPr>
             <a:r>
-              <a:rPr lang="en-US" sz="1200" dirty="0" smtClean="0">
+              <a:rPr lang="en-US" sz="5800" dirty="0">
                 <a:latin typeface="Times"/>
                 <a:cs typeface="Times"/>
               </a:rPr>
@@ -4149,7 +4149,7 @@
             </a:r>
           </a:p>
           <a:p>
-            <a:pPr marL="171450" indent="-171450">
+            <a:pPr marL="822960" indent="-822960">
               <a:buClr>
                 <a:srgbClr val="991132"/>
               </a:buClr>
@@ -4158,7 +4158,7 @@
               <a:buChar char="v"/>
             </a:pPr>
             <a:r>
-              <a:rPr lang="en-US" sz="1200" dirty="0" smtClean="0">
+              <a:rPr lang="en-US" sz="5800" dirty="0">
                 <a:latin typeface="Times"/>
                 <a:cs typeface="Times"/>
               </a:rPr>
@@ -4166,7 +4166,7 @@
             </a:r>
           </a:p>
           <a:p>
-            <a:pPr marL="171450" indent="-171450">
+            <a:pPr marL="822960" indent="-822960">
               <a:buClr>
                 <a:srgbClr val="991132"/>
               </a:buClr>
@@ -4175,27 +4175,27 @@
               <a:buChar char="v"/>
             </a:pPr>
             <a:r>
-              <a:rPr lang="en-US" sz="1200" dirty="0" smtClean="0">
+              <a:rPr lang="en-US" sz="5800" dirty="0">
                 <a:latin typeface="Times"/>
                 <a:cs typeface="Times"/>
               </a:rPr>
               <a:t>Access </a:t>
             </a:r>
             <a:r>
-              <a:rPr lang="en-US" sz="1200" dirty="0">
+              <a:rPr lang="en-US" sz="5800" dirty="0">
                 <a:latin typeface="Times"/>
                 <a:cs typeface="Times"/>
               </a:rPr>
               <a:t>S</a:t>
             </a:r>
             <a:r>
-              <a:rPr lang="en-US" sz="1200" dirty="0" smtClean="0">
+              <a:rPr lang="en-US" sz="5800" dirty="0">
                 <a:latin typeface="Times"/>
                 <a:cs typeface="Times"/>
               </a:rPr>
               <a:t>upport Information</a:t>
             </a:r>
-            <a:endParaRPr lang="en-US" sz="1200" dirty="0">
+            <a:endParaRPr lang="en-US" sz="5800" dirty="0">
               <a:latin typeface="Times"/>
               <a:cs typeface="Times"/>
             </a:endParaRPr>
@@ -4210,8 +4210,8 @@
         </p:nvSpPr>
         <p:spPr>
           <a:xfrm>
-            <a:off x="181657" y="5320496"/>
-            <a:ext cx="2254688" cy="1015663"/>
+            <a:off x="871954" y="25538383"/>
+            <a:ext cx="10822502" cy="4875182"/>
           </a:xfrm>
           <a:prstGeom prst="rect">
             <a:avLst/>
@@ -4219,12 +4219,12 @@
           <a:noFill/>
         </p:spPr>
         <p:txBody>
-          <a:bodyPr wrap="square" rtlCol="0">
+          <a:bodyPr wrap="square" lIns="438912" tIns="219456" rIns="438912" bIns="219456" rtlCol="0">
             <a:spAutoFit/>
           </a:bodyPr>
           <a:lstStyle/>
           <a:p>
-            <a:pPr marL="171450" indent="-171450">
+            <a:pPr marL="822960" indent="-822960">
               <a:buClr>
                 <a:srgbClr val="991132"/>
               </a:buClr>
@@ -4233,7 +4233,7 @@
               <a:buChar char="v"/>
             </a:pPr>
             <a:r>
-              <a:rPr lang="en-US" sz="1200" dirty="0" smtClean="0">
+              <a:rPr lang="en-US" sz="5800" dirty="0">
                 <a:latin typeface="Times"/>
                 <a:cs typeface="Times"/>
               </a:rPr>
@@ -4241,7 +4241,7 @@
             </a:r>
           </a:p>
           <a:p>
-            <a:pPr marL="171450" indent="-171450">
+            <a:pPr marL="822960" indent="-822960">
               <a:buClr>
                 <a:srgbClr val="991132"/>
               </a:buClr>
@@ -4250,7 +4250,7 @@
               <a:buChar char="v"/>
             </a:pPr>
             <a:r>
-              <a:rPr lang="en-US" sz="1200" dirty="0" smtClean="0">
+              <a:rPr lang="en-US" sz="5800" dirty="0">
                 <a:latin typeface="Times"/>
                 <a:cs typeface="Times"/>
               </a:rPr>
@@ -4258,7 +4258,7 @@
             </a:r>
           </a:p>
           <a:p>
-            <a:pPr marL="171450" indent="-171450">
+            <a:pPr marL="822960" indent="-822960">
               <a:buClr>
                 <a:srgbClr val="991132"/>
               </a:buClr>
@@ -4267,7 +4267,7 @@
               <a:buChar char="v"/>
             </a:pPr>
             <a:r>
-              <a:rPr lang="en-US" sz="1200" dirty="0" smtClean="0">
+              <a:rPr lang="en-US" sz="5800" dirty="0">
                 <a:latin typeface="Times"/>
                 <a:cs typeface="Times"/>
               </a:rPr>
@@ -4284,8 +4284,8 @@
         </p:nvSpPr>
         <p:spPr>
           <a:xfrm>
-            <a:off x="2710296" y="4896487"/>
-            <a:ext cx="6387983" cy="369332"/>
+            <a:off x="13009423" y="23503137"/>
+            <a:ext cx="30662318" cy="1772794"/>
           </a:xfrm>
           <a:prstGeom prst="rect">
             <a:avLst/>
@@ -4293,7 +4293,7 @@
           <a:noFill/>
         </p:spPr>
         <p:txBody>
-          <a:bodyPr wrap="square" rtlCol="0">
+          <a:bodyPr wrap="square" lIns="438912" tIns="219456" rIns="438912" bIns="219456" rtlCol="0">
             <a:spAutoFit/>
           </a:bodyPr>
           <a:lstStyle/>
@@ -4316,8 +4316,8 @@
         </p:nvSpPr>
         <p:spPr>
           <a:xfrm>
-            <a:off x="2710296" y="5265819"/>
-            <a:ext cx="2349767" cy="1015663"/>
+            <a:off x="13009423" y="25275934"/>
+            <a:ext cx="11278882" cy="4875182"/>
           </a:xfrm>
           <a:prstGeom prst="rect">
             <a:avLst/>
@@ -4325,12 +4325,12 @@
           <a:noFill/>
         </p:spPr>
         <p:txBody>
-          <a:bodyPr wrap="square" rtlCol="0">
+          <a:bodyPr wrap="square" lIns="438912" tIns="219456" rIns="438912" bIns="219456" rtlCol="0">
             <a:spAutoFit/>
           </a:bodyPr>
           <a:lstStyle/>
           <a:p>
-            <a:pPr marL="171450" indent="-171450">
+            <a:pPr marL="822960" indent="-822960">
               <a:buClr>
                 <a:srgbClr val="991132"/>
               </a:buClr>
@@ -4339,33 +4339,33 @@
               <a:buChar char="v"/>
             </a:pPr>
             <a:r>
-              <a:rPr lang="en-US" sz="1200" dirty="0" smtClean="0">
+              <a:rPr lang="en-US" sz="5800" dirty="0">
                 <a:latin typeface="Times"/>
                 <a:cs typeface="Times"/>
               </a:rPr>
               <a:t>Communication </a:t>
             </a:r>
             <a:r>
-              <a:rPr lang="en-US" sz="1200" dirty="0">
+              <a:rPr lang="en-US" sz="5800" dirty="0">
                 <a:latin typeface="Times"/>
                 <a:cs typeface="Times"/>
               </a:rPr>
               <a:t>layer between </a:t>
             </a:r>
             <a:r>
-              <a:rPr lang="en-US" sz="1200" dirty="0" smtClean="0">
+              <a:rPr lang="en-US" sz="5800" dirty="0">
                 <a:latin typeface="Times"/>
                 <a:cs typeface="Times"/>
               </a:rPr>
               <a:t>server and mobile apps</a:t>
             </a:r>
-            <a:endParaRPr lang="en-US" sz="1200" dirty="0">
+            <a:endParaRPr lang="en-US" sz="5800" dirty="0">
               <a:latin typeface="Times"/>
               <a:cs typeface="Times"/>
             </a:endParaRPr>
           </a:p>
           <a:p>
-            <a:pPr marL="171450" indent="-171450">
+            <a:pPr marL="822960" indent="-822960">
               <a:buClr>
                 <a:srgbClr val="991132"/>
               </a:buClr>
@@ -4374,7 +4374,7 @@
               <a:buChar char="v"/>
             </a:pPr>
             <a:r>
-              <a:rPr lang="en-US" sz="1200" dirty="0" smtClean="0">
+              <a:rPr lang="en-US" sz="5800" dirty="0">
                 <a:latin typeface="Times"/>
                 <a:cs typeface="Times"/>
               </a:rPr>
@@ -4405,8 +4405,8 @@
         </p:blipFill>
         <p:spPr>
           <a:xfrm>
-            <a:off x="4907806" y="5153581"/>
-            <a:ext cx="4217475" cy="1521334"/>
+            <a:off x="23557471" y="24737189"/>
+            <a:ext cx="20243880" cy="7302403"/>
           </a:xfrm>
           <a:prstGeom prst="rect">
             <a:avLst/>
@@ -4428,8 +4428,8 @@
         </p:nvSpPr>
         <p:spPr>
           <a:xfrm>
-            <a:off x="2355659" y="614032"/>
-            <a:ext cx="2383285" cy="600164"/>
+            <a:off x="11307166" y="2947354"/>
+            <a:ext cx="11439768" cy="2880787"/>
           </a:xfrm>
           <a:prstGeom prst="rect">
             <a:avLst/>
@@ -4438,13 +4438,13 @@
           <a:effectLst/>
         </p:spPr>
         <p:txBody>
-          <a:bodyPr wrap="none" rtlCol="0">
+          <a:bodyPr wrap="none" lIns="438912" tIns="219456" rIns="438912" bIns="219456" rtlCol="0">
             <a:spAutoFit/>
           </a:bodyPr>
           <a:lstStyle/>
           <a:p>
             <a:r>
-              <a:rPr lang="en-US" sz="3300" dirty="0" smtClean="0">
+              <a:rPr lang="en-US" sz="15800" dirty="0">
                 <a:effectLst>
                   <a:outerShdw blurRad="82550" dist="63500" dir="2700000" algn="tl" rotWithShape="0">
                     <a:prstClr val="black">
@@ -4468,8 +4468,8 @@
         </p:nvSpPr>
         <p:spPr>
           <a:xfrm>
-            <a:off x="6603761" y="2864117"/>
-            <a:ext cx="2492493" cy="369332"/>
+            <a:off x="31698055" y="13747761"/>
+            <a:ext cx="11963966" cy="1772794"/>
           </a:xfrm>
           <a:prstGeom prst="rect">
             <a:avLst/>
@@ -4477,7 +4477,7 @@
           <a:noFill/>
         </p:spPr>
         <p:txBody>
-          <a:bodyPr wrap="square" rtlCol="0">
+          <a:bodyPr wrap="square" lIns="438912" tIns="219456" rIns="438912" bIns="219456" rtlCol="0">
             <a:spAutoFit/>
           </a:bodyPr>
           <a:lstStyle/>
@@ -4490,7 +4490,7 @@
               </a:rPr>
               <a:t>Features</a:t>
             </a:r>
-            <a:endParaRPr lang="en-US" sz="1200" b="1" u="sng" dirty="0">
+            <a:endParaRPr lang="en-US" sz="5800" b="1" u="sng" dirty="0">
               <a:latin typeface="Times"/>
               <a:cs typeface="Times"/>
             </a:endParaRPr>
@@ -4505,8 +4505,8 @@
         </p:nvSpPr>
         <p:spPr>
           <a:xfrm>
-            <a:off x="53858" y="4961800"/>
-            <a:ext cx="2492493" cy="369332"/>
+            <a:off x="258521" y="23816640"/>
+            <a:ext cx="11963966" cy="1772794"/>
           </a:xfrm>
           <a:prstGeom prst="rect">
             <a:avLst/>
@@ -4514,7 +4514,7 @@
           <a:noFill/>
         </p:spPr>
         <p:txBody>
-          <a:bodyPr wrap="square" rtlCol="0">
+          <a:bodyPr wrap="square" lIns="438912" tIns="219456" rIns="438912" bIns="219456" rtlCol="0">
             <a:spAutoFit/>
           </a:bodyPr>
           <a:lstStyle/>
@@ -4527,7 +4527,7 @@
               </a:rPr>
               <a:t>Features</a:t>
             </a:r>
-            <a:endParaRPr lang="en-US" sz="1200" b="1" u="sng" dirty="0">
+            <a:endParaRPr lang="en-US" sz="5800" b="1" u="sng" dirty="0">
               <a:latin typeface="Times"/>
               <a:cs typeface="Times"/>
             </a:endParaRPr>
@@ -4547,7 +4547,7 @@
   <p:timing>
     <p:tnLst>
       <p:par>
-        <p:cTn xmlns:p14="http://schemas.microsoft.com/office/powerpoint/2010/main" id="1" dur="indefinite" restart="never" nodeType="tmRoot"/>
+        <p:cTn id="1" dur="indefinite" restart="never" nodeType="tmRoot"/>
       </p:par>
     </p:tnLst>
   </p:timing>

</xml_diff>